<commit_message>
Created interim report to combine proof of concept work so far
</commit_message>
<xml_diff>
--- a/documents/Interim Presentation.pptx
+++ b/documents/Interim Presentation.pptx
@@ -12,7 +12,7 @@
     <p:sldId id="257" r:id="rId3"/>
     <p:sldId id="258" r:id="rId4"/>
     <p:sldId id="259" r:id="rId5"/>
-    <p:sldId id="260" r:id="rId6"/>
+    <p:sldId id="264" r:id="rId6"/>
     <p:sldId id="261" r:id="rId7"/>
     <p:sldId id="262" r:id="rId8"/>
   </p:sldIdLst>
@@ -113,6 +113,11 @@
       </a:defRPr>
     </a:lvl9pPr>
   </p:defaultTextStyle>
+  <p:extLst>
+    <p:ext uri="{EFAFB233-063F-42B5-8137-9DF3F51BA10A}">
+      <p15:sldGuideLst xmlns:p15="http://schemas.microsoft.com/office/powerpoint/2012/main"/>
+    </p:ext>
+  </p:extLst>
 </p:presentation>
 </file>
 
@@ -7222,13 +7227,13 @@
   <p:clrMapOvr>
     <a:overrideClrMapping bg1="lt1" tx1="dk1" bg2="lt2" tx2="dk2" accent1="accent1" accent2="accent2" accent3="accent3" accent4="accent4" accent5="accent5" accent6="accent6" hlink="hlink" folHlink="folHlink"/>
   </p:clrMapOvr>
-  <mc:AlternateContent xmlns:mc="http://schemas.openxmlformats.org/markup-compatibility/2006">
-    <mc:Choice xmlns:p159="http://schemas.microsoft.com/office/powerpoint/2015/09/main" Requires="p159">
+  <mc:AlternateContent xmlns:mc="http://schemas.openxmlformats.org/markup-compatibility/2006" xmlns:p159="http://schemas.microsoft.com/office/powerpoint/2015/09/main">
+    <mc:Choice Requires="p159">
       <p:transition xmlns:p14="http://schemas.microsoft.com/office/powerpoint/2010/main" spd="slow" p14:dur="2000">
         <p159:morph option="byObject"/>
       </p:transition>
     </mc:Choice>
-    <mc:Fallback>
+    <mc:Fallback xmlns="">
       <p:transition spd="slow">
         <p:fade/>
       </p:transition>
@@ -7420,13 +7425,7 @@
   <p:cSld>
     <p:spTree>
       <p:nvGrpSpPr>
-        <p:cNvPr id="1" name="">
-          <a:extLst>
-            <a:ext uri="{FF2B5EF4-FFF2-40B4-BE49-F238E27FC236}">
-              <a16:creationId xmlns:a16="http://schemas.microsoft.com/office/drawing/2014/main" id="{ABE00440-8E44-00ED-0FA2-96E019BB97F1}"/>
-            </a:ext>
-          </a:extLst>
-        </p:cNvPr>
+        <p:cNvPr id="1" name=""/>
         <p:cNvGrpSpPr/>
         <p:nvPr/>
       </p:nvGrpSpPr>
@@ -7443,7 +7442,7 @@
           <p:cNvPr id="2" name="Title 1">
             <a:extLst>
               <a:ext uri="{FF2B5EF4-FFF2-40B4-BE49-F238E27FC236}">
-                <a16:creationId xmlns:a16="http://schemas.microsoft.com/office/drawing/2014/main" id="{CF0AAC0F-74E7-7561-8F31-CDE44956CEC0}"/>
+                <a16:creationId xmlns:a16="http://schemas.microsoft.com/office/drawing/2014/main" id="{4ABD8A5F-47B7-9470-2038-5C60F0986788}"/>
               </a:ext>
             </a:extLst>
           </p:cNvPr>
@@ -7468,10 +7467,10 @@
       </p:sp>
       <p:sp>
         <p:nvSpPr>
-          <p:cNvPr id="3" name="Content Placeholder 2">
+          <p:cNvPr id="3" name="Text Placeholder 2">
             <a:extLst>
               <a:ext uri="{FF2B5EF4-FFF2-40B4-BE49-F238E27FC236}">
-                <a16:creationId xmlns:a16="http://schemas.microsoft.com/office/drawing/2014/main" id="{DC71B40A-59E6-8589-F0E5-5AE011BCDC63}"/>
+                <a16:creationId xmlns:a16="http://schemas.microsoft.com/office/drawing/2014/main" id="{795594C3-AFD3-E3FA-0492-A3F1ABA8D06C}"/>
               </a:ext>
             </a:extLst>
           </p:cNvPr>
@@ -7479,7 +7478,88 @@
             <a:spLocks noGrp="1"/>
           </p:cNvSpPr>
           <p:nvPr>
-            <p:ph idx="1"/>
+            <p:ph type="body" idx="1"/>
+          </p:nvPr>
+        </p:nvSpPr>
+        <p:spPr/>
+        <p:txBody>
+          <a:bodyPr/>
+          <a:lstStyle/>
+          <a:p>
+            <a:r>
+              <a:rPr lang="en-GB" dirty="0"/>
+              <a:t>Bandit Problem Proof of Concept</a:t>
+            </a:r>
+          </a:p>
+        </p:txBody>
+      </p:sp>
+      <p:sp>
+        <p:nvSpPr>
+          <p:cNvPr id="4" name="Content Placeholder 3">
+            <a:extLst>
+              <a:ext uri="{FF2B5EF4-FFF2-40B4-BE49-F238E27FC236}">
+                <a16:creationId xmlns:a16="http://schemas.microsoft.com/office/drawing/2014/main" id="{889101B5-A157-B995-D2AF-EB623742E79D}"/>
+              </a:ext>
+            </a:extLst>
+          </p:cNvPr>
+          <p:cNvSpPr>
+            <a:spLocks noGrp="1"/>
+          </p:cNvSpPr>
+          <p:nvPr>
+            <p:ph sz="half" idx="2"/>
+          </p:nvPr>
+        </p:nvSpPr>
+        <p:spPr/>
+        <p:txBody>
+          <a:bodyPr/>
+          <a:lstStyle/>
+          <a:p>
+            <a:endParaRPr lang="en-GB"/>
+          </a:p>
+        </p:txBody>
+      </p:sp>
+      <p:sp>
+        <p:nvSpPr>
+          <p:cNvPr id="5" name="Text Placeholder 4">
+            <a:extLst>
+              <a:ext uri="{FF2B5EF4-FFF2-40B4-BE49-F238E27FC236}">
+                <a16:creationId xmlns:a16="http://schemas.microsoft.com/office/drawing/2014/main" id="{1D9A580E-4523-10C0-7FB4-1C4F83E90E83}"/>
+              </a:ext>
+            </a:extLst>
+          </p:cNvPr>
+          <p:cNvSpPr>
+            <a:spLocks noGrp="1"/>
+          </p:cNvSpPr>
+          <p:nvPr>
+            <p:ph type="body" sz="quarter" idx="3"/>
+          </p:nvPr>
+        </p:nvSpPr>
+        <p:spPr/>
+        <p:txBody>
+          <a:bodyPr/>
+          <a:lstStyle/>
+          <a:p>
+            <a:r>
+              <a:rPr lang="en-GB" dirty="0"/>
+              <a:t>Connect4 Proof of Concept</a:t>
+            </a:r>
+          </a:p>
+        </p:txBody>
+      </p:sp>
+      <p:sp>
+        <p:nvSpPr>
+          <p:cNvPr id="6" name="Content Placeholder 5">
+            <a:extLst>
+              <a:ext uri="{FF2B5EF4-FFF2-40B4-BE49-F238E27FC236}">
+                <a16:creationId xmlns:a16="http://schemas.microsoft.com/office/drawing/2014/main" id="{EF72A3BA-87CE-38F5-F9EE-C615BF6D1EDF}"/>
+              </a:ext>
+            </a:extLst>
+          </p:cNvPr>
+          <p:cNvSpPr>
+            <a:spLocks noGrp="1"/>
+          </p:cNvSpPr>
+          <p:nvPr>
+            <p:ph sz="quarter" idx="4"/>
           </p:nvPr>
         </p:nvSpPr>
         <p:spPr/>
@@ -7494,7 +7574,7 @@
     </p:spTree>
     <p:extLst>
       <p:ext uri="{BB962C8B-B14F-4D97-AF65-F5344CB8AC3E}">
-        <p14:creationId xmlns:p14="http://schemas.microsoft.com/office/powerpoint/2010/main" val="2994261774"/>
+        <p14:creationId xmlns:p14="http://schemas.microsoft.com/office/powerpoint/2010/main" val="4202131948"/>
       </p:ext>
     </p:extLst>
   </p:cSld>

</xml_diff>

<commit_message>
Further work on rough presentation layout
</commit_message>
<xml_diff>
--- a/documents/Interim Presentation.pptx
+++ b/documents/Interim Presentation.pptx
@@ -7210,10 +7210,49 @@
           </a:bodyPr>
           <a:lstStyle/>
           <a:p>
-            <a:pPr marL="36900" indent="0">
+            <a:pPr marL="36900" indent="0" algn="ctr">
               <a:buNone/>
             </a:pPr>
-            <a:endParaRPr lang="en-GB" dirty="0"/>
+            <a:r>
+              <a:rPr lang="en-GB" dirty="0"/>
+              <a:t>What is Monte-Carlo Tree Search?</a:t>
+            </a:r>
+          </a:p>
+          <a:p>
+            <a:pPr marL="36900" indent="0" algn="ctr">
+              <a:buNone/>
+            </a:pPr>
+            <a:r>
+              <a:rPr lang="en-GB" dirty="0"/>
+              <a:t>How does it work?</a:t>
+            </a:r>
+          </a:p>
+          <a:p>
+            <a:pPr marL="36900" indent="0" algn="ctr">
+              <a:buNone/>
+            </a:pPr>
+            <a:r>
+              <a:rPr lang="en-GB" dirty="0"/>
+              <a:t>Why is it cool?</a:t>
+            </a:r>
+          </a:p>
+          <a:p>
+            <a:pPr marL="36900" indent="0" algn="ctr">
+              <a:buNone/>
+            </a:pPr>
+            <a:r>
+              <a:rPr lang="en-GB" dirty="0"/>
+              <a:t>What has been my approach so far?</a:t>
+            </a:r>
+          </a:p>
+          <a:p>
+            <a:pPr marL="36900" indent="0" algn="ctr">
+              <a:buNone/>
+            </a:pPr>
+            <a:r>
+              <a:rPr lang="en-GB" dirty="0"/>
+              <a:t>What are my next steps?</a:t>
+            </a:r>
           </a:p>
         </p:txBody>
       </p:sp>
@@ -7288,7 +7327,7 @@
           <a:p>
             <a:r>
               <a:rPr lang="en-GB" dirty="0"/>
-              <a:t>Context</a:t>
+              <a:t>What is the algorithm?</a:t>
             </a:r>
           </a:p>
         </p:txBody>
@@ -7314,7 +7353,49 @@
           <a:bodyPr/>
           <a:lstStyle/>
           <a:p>
-            <a:endParaRPr lang="en-GB"/>
+            <a:pPr marL="36900" indent="0">
+              <a:buNone/>
+            </a:pPr>
+            <a:r>
+              <a:rPr lang="en-GB" dirty="0"/>
+              <a:t>A tree search algorithm, an algorithm for searching trees.</a:t>
+            </a:r>
+          </a:p>
+          <a:p>
+            <a:pPr marL="36900" indent="0">
+              <a:buNone/>
+            </a:pPr>
+            <a:r>
+              <a:rPr lang="en-GB" dirty="0"/>
+              <a:t>Mote Carlo Tree Search is a heuristic algorithm; meaning … . </a:t>
+            </a:r>
+          </a:p>
+          <a:p>
+            <a:pPr marL="36900" indent="0">
+              <a:buNone/>
+            </a:pPr>
+            <a:r>
+              <a:rPr lang="en-GB" dirty="0"/>
+              <a:t>It preforms simulations on unexplored parts of the tree and stores the statistics of actions it's made to make more educated selections in each further iteration. </a:t>
+            </a:r>
+          </a:p>
+          <a:p>
+            <a:pPr marL="36900" indent="0">
+              <a:buNone/>
+            </a:pPr>
+            <a:r>
+              <a:rPr lang="en-GB" dirty="0"/>
+              <a:t>It is a great algorithm to showcase the learning capabilities of AI.</a:t>
+            </a:r>
+          </a:p>
+          <a:p>
+            <a:pPr marL="36900" indent="0">
+              <a:buNone/>
+            </a:pPr>
+            <a:r>
+              <a:rPr lang="en-GB" dirty="0"/>
+              <a:t>In my project I will be making a Connect4 game that a person can play against AI that will be using this algorithm.</a:t>
+            </a:r>
           </a:p>
         </p:txBody>
       </p:sp>
@@ -7403,7 +7484,40 @@
           <a:bodyPr/>
           <a:lstStyle/>
           <a:p>
-            <a:endParaRPr lang="en-GB"/>
+            <a:pPr marL="494100" indent="-457200">
+              <a:buAutoNum type="arabicPeriod"/>
+            </a:pPr>
+            <a:r>
+              <a:rPr lang="en-GB" dirty="0"/>
+              <a:t>Selection</a:t>
+            </a:r>
+          </a:p>
+          <a:p>
+            <a:pPr marL="494100" indent="-457200">
+              <a:buAutoNum type="arabicPeriod"/>
+            </a:pPr>
+            <a:r>
+              <a:rPr lang="en-GB" dirty="0"/>
+              <a:t>Expansion</a:t>
+            </a:r>
+          </a:p>
+          <a:p>
+            <a:pPr marL="494100" indent="-457200">
+              <a:buAutoNum type="arabicPeriod"/>
+            </a:pPr>
+            <a:r>
+              <a:rPr lang="en-GB" dirty="0"/>
+              <a:t>Simulation</a:t>
+            </a:r>
+          </a:p>
+          <a:p>
+            <a:pPr marL="494100" indent="-457200">
+              <a:buAutoNum type="arabicPeriod"/>
+            </a:pPr>
+            <a:r>
+              <a:rPr lang="en-GB" dirty="0"/>
+              <a:t>Backpropagation</a:t>
+            </a:r>
           </a:p>
         </p:txBody>
       </p:sp>
@@ -7514,7 +7628,10 @@
           <a:bodyPr/>
           <a:lstStyle/>
           <a:p>
-            <a:endParaRPr lang="en-GB"/>
+            <a:pPr marL="36900" indent="0">
+              <a:buNone/>
+            </a:pPr>
+            <a:endParaRPr lang="en-GB" dirty="0"/>
           </a:p>
         </p:txBody>
       </p:sp>
@@ -7567,7 +7684,10 @@
           <a:bodyPr/>
           <a:lstStyle/>
           <a:p>
-            <a:endParaRPr lang="en-GB"/>
+            <a:pPr marL="36900" indent="0">
+              <a:buNone/>
+            </a:pPr>
+            <a:endParaRPr lang="en-GB" dirty="0"/>
           </a:p>
         </p:txBody>
       </p:sp>
@@ -7656,7 +7776,42 @@
           <a:bodyPr/>
           <a:lstStyle/>
           <a:p>
-            <a:endParaRPr lang="en-GB"/>
+            <a:pPr marL="36900" indent="0">
+              <a:buNone/>
+            </a:pPr>
+            <a:r>
+              <a:rPr lang="en-GB" dirty="0"/>
+              <a:t>Learning about GUI for the Connect4 game.</a:t>
+            </a:r>
+          </a:p>
+          <a:p>
+            <a:pPr marL="36900" indent="0">
+              <a:buNone/>
+            </a:pPr>
+            <a:r>
+              <a:rPr lang="en-GB" dirty="0"/>
+              <a:t>Using my knowledge from the bandit problem </a:t>
+            </a:r>
+            <a:r>
+              <a:rPr lang="en-GB" dirty="0" err="1"/>
+              <a:t>poc</a:t>
+            </a:r>
+            <a:r>
+              <a:rPr lang="en-GB" dirty="0"/>
+              <a:t> and the research done into monte-</a:t>
+            </a:r>
+            <a:r>
+              <a:rPr lang="en-GB" dirty="0" err="1"/>
+              <a:t>carlo</a:t>
+            </a:r>
+            <a:r>
+              <a:rPr lang="en-GB" dirty="0"/>
+              <a:t> tree search to successfully code an Ai to </a:t>
+            </a:r>
+            <a:r>
+              <a:rPr lang="en-GB"/>
+              <a:t>play Connect4.</a:t>
+            </a:r>
           </a:p>
         </p:txBody>
       </p:sp>

</xml_diff>

<commit_message>
Added transitions and animations
</commit_message>
<xml_diff>
--- a/documents/Interim Presentation.pptx
+++ b/documents/Interim Presentation.pptx
@@ -204,7 +204,7 @@
           <a:p>
             <a:fld id="{CB5C49C9-DF04-4E8F-AF05-B27ECBB4FBFB}" type="datetimeFigureOut">
               <a:rPr lang="en-GB" smtClean="0"/>
-              <a:t>06/12/2024</a:t>
+              <a:t>07/12/2024</a:t>
             </a:fld>
             <a:endParaRPr lang="en-GB"/>
           </a:p>
@@ -825,7 +825,7 @@
           <a:p>
             <a:fld id="{D618160B-95F8-46C8-B491-9457990F652B}" type="datetimeFigureOut">
               <a:rPr lang="en-GB" smtClean="0"/>
-              <a:t>06/12/2024</a:t>
+              <a:t>07/12/2024</a:t>
             </a:fld>
             <a:endParaRPr lang="en-GB"/>
           </a:p>
@@ -883,6 +883,9 @@
   <p:clrMapOvr>
     <a:masterClrMapping/>
   </p:clrMapOvr>
+  <p:transition spd="slow">
+    <p:cover/>
+  </p:transition>
 </p:sldLayout>
 </file>
 
@@ -1123,7 +1126,7 @@
           <a:p>
             <a:fld id="{D618160B-95F8-46C8-B491-9457990F652B}" type="datetimeFigureOut">
               <a:rPr lang="en-GB" smtClean="0"/>
-              <a:t>06/12/2024</a:t>
+              <a:t>07/12/2024</a:t>
             </a:fld>
             <a:endParaRPr lang="en-GB"/>
           </a:p>
@@ -1181,6 +1184,9 @@
   <p:clrMapOvr>
     <a:masterClrMapping/>
   </p:clrMapOvr>
+  <p:transition spd="slow">
+    <p:cover/>
+  </p:transition>
 </p:sldLayout>
 </file>
 
@@ -1315,7 +1321,7 @@
           <a:p>
             <a:fld id="{D618160B-95F8-46C8-B491-9457990F652B}" type="datetimeFigureOut">
               <a:rPr lang="en-GB" smtClean="0"/>
-              <a:t>06/12/2024</a:t>
+              <a:t>07/12/2024</a:t>
             </a:fld>
             <a:endParaRPr lang="en-GB"/>
           </a:p>
@@ -1373,6 +1379,9 @@
   <p:clrMapOvr>
     <a:masterClrMapping/>
   </p:clrMapOvr>
+  <p:transition spd="slow">
+    <p:cover/>
+  </p:transition>
 </p:sldLayout>
 </file>
 
@@ -1576,7 +1585,7 @@
           <a:p>
             <a:fld id="{D618160B-95F8-46C8-B491-9457990F652B}" type="datetimeFigureOut">
               <a:rPr lang="en-GB" smtClean="0"/>
-              <a:t>06/12/2024</a:t>
+              <a:t>07/12/2024</a:t>
             </a:fld>
             <a:endParaRPr lang="en-GB"/>
           </a:p>
@@ -1866,6 +1875,9 @@
   <p:clrMapOvr>
     <a:masterClrMapping/>
   </p:clrMapOvr>
+  <p:transition spd="slow">
+    <p:cover/>
+  </p:transition>
 </p:sldLayout>
 </file>
 
@@ -2000,7 +2012,7 @@
           <a:p>
             <a:fld id="{D618160B-95F8-46C8-B491-9457990F652B}" type="datetimeFigureOut">
               <a:rPr lang="en-GB" smtClean="0"/>
-              <a:t>06/12/2024</a:t>
+              <a:t>07/12/2024</a:t>
             </a:fld>
             <a:endParaRPr lang="en-GB"/>
           </a:p>
@@ -2058,6 +2070,9 @@
   <p:clrMapOvr>
     <a:masterClrMapping/>
   </p:clrMapOvr>
+  <p:transition spd="slow">
+    <p:cover/>
+  </p:transition>
 </p:sldLayout>
 </file>
 
@@ -2537,7 +2552,7 @@
           <a:p>
             <a:fld id="{D618160B-95F8-46C8-B491-9457990F652B}" type="datetimeFigureOut">
               <a:rPr lang="en-GB" smtClean="0"/>
-              <a:t>06/12/2024</a:t>
+              <a:t>07/12/2024</a:t>
             </a:fld>
             <a:endParaRPr lang="en-GB"/>
           </a:p>
@@ -2595,6 +2610,9 @@
   <p:clrMapOvr>
     <a:masterClrMapping/>
   </p:clrMapOvr>
+  <p:transition spd="slow">
+    <p:cover/>
+  </p:transition>
 </p:sldLayout>
 </file>
 
@@ -3401,7 +3419,7 @@
           <a:p>
             <a:fld id="{D618160B-95F8-46C8-B491-9457990F652B}" type="datetimeFigureOut">
               <a:rPr lang="en-GB" smtClean="0"/>
-              <a:t>06/12/2024</a:t>
+              <a:t>07/12/2024</a:t>
             </a:fld>
             <a:endParaRPr lang="en-GB"/>
           </a:p>
@@ -3459,6 +3477,9 @@
   <p:clrMapOvr>
     <a:masterClrMapping/>
   </p:clrMapOvr>
+  <p:transition spd="slow">
+    <p:cover/>
+  </p:transition>
 </p:sldLayout>
 </file>
 
@@ -3571,7 +3592,7 @@
           <a:p>
             <a:fld id="{D618160B-95F8-46C8-B491-9457990F652B}" type="datetimeFigureOut">
               <a:rPr lang="en-GB" smtClean="0"/>
-              <a:t>06/12/2024</a:t>
+              <a:t>07/12/2024</a:t>
             </a:fld>
             <a:endParaRPr lang="en-GB"/>
           </a:p>
@@ -3629,6 +3650,9 @@
   <p:clrMapOvr>
     <a:masterClrMapping/>
   </p:clrMapOvr>
+  <p:transition spd="slow">
+    <p:cover/>
+  </p:transition>
 </p:sldLayout>
 </file>
 
@@ -3755,7 +3779,7 @@
           <a:p>
             <a:fld id="{D618160B-95F8-46C8-B491-9457990F652B}" type="datetimeFigureOut">
               <a:rPr lang="en-GB" smtClean="0"/>
-              <a:t>06/12/2024</a:t>
+              <a:t>07/12/2024</a:t>
             </a:fld>
             <a:endParaRPr lang="en-GB"/>
           </a:p>
@@ -3813,6 +3837,9 @@
   <p:clrMapOvr>
     <a:masterClrMapping/>
   </p:clrMapOvr>
+  <p:transition spd="slow">
+    <p:cover/>
+  </p:transition>
 </p:sldLayout>
 </file>
 
@@ -3925,7 +3952,7 @@
           <a:p>
             <a:fld id="{D618160B-95F8-46C8-B491-9457990F652B}" type="datetimeFigureOut">
               <a:rPr lang="en-GB" smtClean="0"/>
-              <a:t>06/12/2024</a:t>
+              <a:t>07/12/2024</a:t>
             </a:fld>
             <a:endParaRPr lang="en-GB"/>
           </a:p>
@@ -3983,6 +4010,9 @@
   <p:clrMapOvr>
     <a:masterClrMapping/>
   </p:clrMapOvr>
+  <p:transition spd="slow">
+    <p:cover/>
+  </p:transition>
 </p:sldLayout>
 </file>
 
@@ -4169,7 +4199,7 @@
           <a:p>
             <a:fld id="{D618160B-95F8-46C8-B491-9457990F652B}" type="datetimeFigureOut">
               <a:rPr lang="en-GB" smtClean="0"/>
-              <a:t>06/12/2024</a:t>
+              <a:t>07/12/2024</a:t>
             </a:fld>
             <a:endParaRPr lang="en-GB"/>
           </a:p>
@@ -4227,6 +4257,9 @@
   <p:clrMapOvr>
     <a:masterClrMapping/>
   </p:clrMapOvr>
+  <p:transition spd="slow">
+    <p:cover/>
+  </p:transition>
 </p:sldLayout>
 </file>
 
@@ -4405,7 +4438,7 @@
           <a:p>
             <a:fld id="{D618160B-95F8-46C8-B491-9457990F652B}" type="datetimeFigureOut">
               <a:rPr lang="en-GB" smtClean="0"/>
-              <a:t>06/12/2024</a:t>
+              <a:t>07/12/2024</a:t>
             </a:fld>
             <a:endParaRPr lang="en-GB"/>
           </a:p>
@@ -4463,6 +4496,9 @@
   <p:clrMapOvr>
     <a:masterClrMapping/>
   </p:clrMapOvr>
+  <p:transition spd="slow">
+    <p:cover/>
+  </p:transition>
 </p:sldLayout>
 </file>
 
@@ -4871,7 +4907,7 @@
           <a:p>
             <a:fld id="{D618160B-95F8-46C8-B491-9457990F652B}" type="datetimeFigureOut">
               <a:rPr lang="en-GB" smtClean="0"/>
-              <a:t>06/12/2024</a:t>
+              <a:t>07/12/2024</a:t>
             </a:fld>
             <a:endParaRPr lang="en-GB"/>
           </a:p>
@@ -4929,6 +4965,9 @@
   <p:clrMapOvr>
     <a:masterClrMapping/>
   </p:clrMapOvr>
+  <p:transition spd="slow">
+    <p:cover/>
+  </p:transition>
 </p:sldLayout>
 </file>
 
@@ -4989,7 +5028,7 @@
           <a:p>
             <a:fld id="{D618160B-95F8-46C8-B491-9457990F652B}" type="datetimeFigureOut">
               <a:rPr lang="en-GB" smtClean="0"/>
-              <a:t>06/12/2024</a:t>
+              <a:t>07/12/2024</a:t>
             </a:fld>
             <a:endParaRPr lang="en-GB"/>
           </a:p>
@@ -5047,6 +5086,9 @@
   <p:clrMapOvr>
     <a:masterClrMapping/>
   </p:clrMapOvr>
+  <p:transition spd="slow">
+    <p:cover/>
+  </p:transition>
 </p:sldLayout>
 </file>
 
@@ -5084,7 +5126,7 @@
           <a:p>
             <a:fld id="{D618160B-95F8-46C8-B491-9457990F652B}" type="datetimeFigureOut">
               <a:rPr lang="en-GB" smtClean="0"/>
-              <a:t>06/12/2024</a:t>
+              <a:t>07/12/2024</a:t>
             </a:fld>
             <a:endParaRPr lang="en-GB"/>
           </a:p>
@@ -5142,6 +5184,9 @@
   <p:clrMapOvr>
     <a:masterClrMapping/>
   </p:clrMapOvr>
+  <p:transition spd="slow">
+    <p:cover/>
+  </p:transition>
 </p:sldLayout>
 </file>
 
@@ -5339,7 +5384,7 @@
           <a:p>
             <a:fld id="{D618160B-95F8-46C8-B491-9457990F652B}" type="datetimeFigureOut">
               <a:rPr lang="en-GB" smtClean="0"/>
-              <a:t>06/12/2024</a:t>
+              <a:t>07/12/2024</a:t>
             </a:fld>
             <a:endParaRPr lang="en-GB"/>
           </a:p>
@@ -5397,6 +5442,9 @@
   <p:clrMapOvr>
     <a:masterClrMapping/>
   </p:clrMapOvr>
+  <p:transition spd="slow">
+    <p:cover/>
+  </p:transition>
 </p:sldLayout>
 </file>
 
@@ -5639,7 +5687,7 @@
           <a:p>
             <a:fld id="{D618160B-95F8-46C8-B491-9457990F652B}" type="datetimeFigureOut">
               <a:rPr lang="en-GB" smtClean="0"/>
-              <a:t>06/12/2024</a:t>
+              <a:t>07/12/2024</a:t>
             </a:fld>
             <a:endParaRPr lang="en-GB"/>
           </a:p>
@@ -5697,6 +5745,9 @@
   <p:clrMapOvr>
     <a:masterClrMapping/>
   </p:clrMapOvr>
+  <p:transition spd="slow">
+    <p:cover/>
+  </p:transition>
 </p:sldLayout>
 </file>
 
@@ -5873,7 +5924,7 @@
           <a:p>
             <a:fld id="{D618160B-95F8-46C8-B491-9457990F652B}" type="datetimeFigureOut">
               <a:rPr lang="en-GB" smtClean="0"/>
-              <a:t>06/12/2024</a:t>
+              <a:t>07/12/2024</a:t>
             </a:fld>
             <a:endParaRPr lang="en-GB"/>
           </a:p>
@@ -5998,6 +6049,9 @@
     <p:sldLayoutId id="2147483676" r:id="rId16"/>
     <p:sldLayoutId id="2147483677" r:id="rId17"/>
   </p:sldLayoutIdLst>
+  <p:transition spd="slow">
+    <p:cover/>
+  </p:transition>
   <p:txStyles>
     <p:titleStyle>
       <a:lvl1pPr algn="ctr" defTabSz="457200" rtl="0" eaLnBrk="1" latinLnBrk="0" hangingPunct="1">
@@ -6649,13 +6703,13 @@
           <a:lstStyle/>
           <a:p>
             <a:r>
-              <a:rPr lang="en-GB"/>
+              <a:rPr lang="en-GB" dirty="0"/>
               <a:t>Presentation by</a:t>
             </a:r>
           </a:p>
           <a:p>
             <a:r>
-              <a:rPr lang="en-GB"/>
+              <a:rPr lang="en-GB" dirty="0"/>
               <a:t>Alexandra Danciu</a:t>
             </a:r>
           </a:p>
@@ -6754,6 +6808,9 @@
   <p:clrMapOvr>
     <a:masterClrMapping/>
   </p:clrMapOvr>
+  <p:transition spd="slow">
+    <p:cover/>
+  </p:transition>
   <p:timing>
     <p:tnLst>
       <p:par>
@@ -6992,7 +7049,7 @@
     </p:tnLst>
     <p:bldLst>
       <p:bldP spid="2" grpId="0"/>
-      <p:bldP spid="3" grpId="0" build="p"/>
+      <p:bldP spid="3" grpId="0" uiExpand="1" build="p"/>
     </p:bldLst>
   </p:timing>
 </p:sld>
@@ -7276,18 +7333,9 @@
   <p:clrMapOvr>
     <a:overrideClrMapping bg1="lt1" tx1="dk1" bg2="lt2" tx2="dk2" accent1="accent1" accent2="accent2" accent3="accent3" accent4="accent4" accent5="accent5" accent6="accent6" hlink="hlink" folHlink="folHlink"/>
   </p:clrMapOvr>
-  <mc:AlternateContent xmlns:mc="http://schemas.openxmlformats.org/markup-compatibility/2006" xmlns:p159="http://schemas.microsoft.com/office/powerpoint/2015/09/main">
-    <mc:Choice Requires="p159">
-      <p:transition xmlns:p14="http://schemas.microsoft.com/office/powerpoint/2010/main" spd="slow" p14:dur="2000">
-        <p159:morph option="byObject"/>
-      </p:transition>
-    </mc:Choice>
-    <mc:Fallback xmlns="">
-      <p:transition spd="slow">
-        <p:fade/>
-      </p:transition>
-    </mc:Fallback>
-  </mc:AlternateContent>
+  <p:transition spd="slow">
+    <p:cover/>
+  </p:transition>
 </p:sld>
 </file>
 
@@ -7468,6 +7516,9 @@
   <p:clrMapOvr>
     <a:masterClrMapping/>
   </p:clrMapOvr>
+  <p:transition spd="slow">
+    <p:cover/>
+  </p:transition>
 </p:sld>
 </file>
 
@@ -7761,6 +7812,9 @@
   <p:clrMapOvr>
     <a:masterClrMapping/>
   </p:clrMapOvr>
+  <p:transition spd="slow">
+    <p:cover/>
+  </p:transition>
 </p:sld>
 </file>
 
@@ -7888,6 +7942,9 @@
   <p:clrMapOvr>
     <a:masterClrMapping/>
   </p:clrMapOvr>
+  <p:transition spd="slow">
+    <p:cover/>
+  </p:transition>
 </p:sld>
 </file>
 
@@ -8074,6 +8131,243 @@
   <p:clrMapOvr>
     <a:masterClrMapping/>
   </p:clrMapOvr>
+  <p:transition spd="slow">
+    <p:cover/>
+  </p:transition>
+  <p:timing>
+    <p:tnLst>
+      <p:par>
+        <p:cTn id="1" dur="indefinite" restart="never" nodeType="tmRoot">
+          <p:childTnLst>
+            <p:seq concurrent="1" nextAc="seek">
+              <p:cTn id="2" dur="indefinite" nodeType="mainSeq">
+                <p:childTnLst>
+                  <p:par>
+                    <p:cTn id="3" fill="hold">
+                      <p:stCondLst>
+                        <p:cond delay="indefinite"/>
+                      </p:stCondLst>
+                      <p:childTnLst>
+                        <p:par>
+                          <p:cTn id="4" fill="hold">
+                            <p:stCondLst>
+                              <p:cond delay="0"/>
+                            </p:stCondLst>
+                            <p:childTnLst>
+                              <p:par>
+                                <p:cTn id="5" presetID="32" presetClass="emph" presetSubtype="0" fill="hold" nodeType="clickEffect">
+                                  <p:stCondLst>
+                                    <p:cond delay="0"/>
+                                  </p:stCondLst>
+                                  <p:childTnLst>
+                                    <p:animRot by="120000">
+                                      <p:cBhvr>
+                                        <p:cTn id="6" dur="100" fill="hold">
+                                          <p:stCondLst>
+                                            <p:cond delay="0"/>
+                                          </p:stCondLst>
+                                        </p:cTn>
+                                        <p:tgtEl>
+                                          <p:spTgt spid="9"/>
+                                        </p:tgtEl>
+                                        <p:attrNameLst>
+                                          <p:attrName>r</p:attrName>
+                                        </p:attrNameLst>
+                                      </p:cBhvr>
+                                    </p:animRot>
+                                    <p:animRot by="-240000">
+                                      <p:cBhvr>
+                                        <p:cTn id="7" dur="200" fill="hold">
+                                          <p:stCondLst>
+                                            <p:cond delay="200"/>
+                                          </p:stCondLst>
+                                        </p:cTn>
+                                        <p:tgtEl>
+                                          <p:spTgt spid="9"/>
+                                        </p:tgtEl>
+                                        <p:attrNameLst>
+                                          <p:attrName>r</p:attrName>
+                                        </p:attrNameLst>
+                                      </p:cBhvr>
+                                    </p:animRot>
+                                    <p:animRot by="240000">
+                                      <p:cBhvr>
+                                        <p:cTn id="8" dur="200" fill="hold">
+                                          <p:stCondLst>
+                                            <p:cond delay="400"/>
+                                          </p:stCondLst>
+                                        </p:cTn>
+                                        <p:tgtEl>
+                                          <p:spTgt spid="9"/>
+                                        </p:tgtEl>
+                                        <p:attrNameLst>
+                                          <p:attrName>r</p:attrName>
+                                        </p:attrNameLst>
+                                      </p:cBhvr>
+                                    </p:animRot>
+                                    <p:animRot by="-240000">
+                                      <p:cBhvr>
+                                        <p:cTn id="9" dur="200" fill="hold">
+                                          <p:stCondLst>
+                                            <p:cond delay="600"/>
+                                          </p:stCondLst>
+                                        </p:cTn>
+                                        <p:tgtEl>
+                                          <p:spTgt spid="9"/>
+                                        </p:tgtEl>
+                                        <p:attrNameLst>
+                                          <p:attrName>r</p:attrName>
+                                        </p:attrNameLst>
+                                      </p:cBhvr>
+                                    </p:animRot>
+                                    <p:animRot by="120000">
+                                      <p:cBhvr>
+                                        <p:cTn id="10" dur="200" fill="hold">
+                                          <p:stCondLst>
+                                            <p:cond delay="800"/>
+                                          </p:stCondLst>
+                                        </p:cTn>
+                                        <p:tgtEl>
+                                          <p:spTgt spid="9"/>
+                                        </p:tgtEl>
+                                        <p:attrNameLst>
+                                          <p:attrName>r</p:attrName>
+                                        </p:attrNameLst>
+                                      </p:cBhvr>
+                                    </p:animRot>
+                                  </p:childTnLst>
+                                </p:cTn>
+                              </p:par>
+                            </p:childTnLst>
+                          </p:cTn>
+                        </p:par>
+                      </p:childTnLst>
+                    </p:cTn>
+                  </p:par>
+                  <p:par>
+                    <p:cTn id="11" fill="hold">
+                      <p:stCondLst>
+                        <p:cond delay="indefinite"/>
+                      </p:stCondLst>
+                      <p:childTnLst>
+                        <p:par>
+                          <p:cTn id="12" fill="hold">
+                            <p:stCondLst>
+                              <p:cond delay="0"/>
+                            </p:stCondLst>
+                            <p:childTnLst>
+                              <p:par>
+                                <p:cTn id="13" presetID="32" presetClass="emph" presetSubtype="0" fill="hold" nodeType="clickEffect">
+                                  <p:stCondLst>
+                                    <p:cond delay="0"/>
+                                  </p:stCondLst>
+                                  <p:childTnLst>
+                                    <p:animRot by="120000">
+                                      <p:cBhvr>
+                                        <p:cTn id="14" dur="100" fill="hold">
+                                          <p:stCondLst>
+                                            <p:cond delay="0"/>
+                                          </p:stCondLst>
+                                        </p:cTn>
+                                        <p:tgtEl>
+                                          <p:spTgt spid="11"/>
+                                        </p:tgtEl>
+                                        <p:attrNameLst>
+                                          <p:attrName>r</p:attrName>
+                                        </p:attrNameLst>
+                                      </p:cBhvr>
+                                    </p:animRot>
+                                    <p:animRot by="-240000">
+                                      <p:cBhvr>
+                                        <p:cTn id="15" dur="200" fill="hold">
+                                          <p:stCondLst>
+                                            <p:cond delay="200"/>
+                                          </p:stCondLst>
+                                        </p:cTn>
+                                        <p:tgtEl>
+                                          <p:spTgt spid="11"/>
+                                        </p:tgtEl>
+                                        <p:attrNameLst>
+                                          <p:attrName>r</p:attrName>
+                                        </p:attrNameLst>
+                                      </p:cBhvr>
+                                    </p:animRot>
+                                    <p:animRot by="240000">
+                                      <p:cBhvr>
+                                        <p:cTn id="16" dur="200" fill="hold">
+                                          <p:stCondLst>
+                                            <p:cond delay="400"/>
+                                          </p:stCondLst>
+                                        </p:cTn>
+                                        <p:tgtEl>
+                                          <p:spTgt spid="11"/>
+                                        </p:tgtEl>
+                                        <p:attrNameLst>
+                                          <p:attrName>r</p:attrName>
+                                        </p:attrNameLst>
+                                      </p:cBhvr>
+                                    </p:animRot>
+                                    <p:animRot by="-240000">
+                                      <p:cBhvr>
+                                        <p:cTn id="17" dur="200" fill="hold">
+                                          <p:stCondLst>
+                                            <p:cond delay="600"/>
+                                          </p:stCondLst>
+                                        </p:cTn>
+                                        <p:tgtEl>
+                                          <p:spTgt spid="11"/>
+                                        </p:tgtEl>
+                                        <p:attrNameLst>
+                                          <p:attrName>r</p:attrName>
+                                        </p:attrNameLst>
+                                      </p:cBhvr>
+                                    </p:animRot>
+                                    <p:animRot by="120000">
+                                      <p:cBhvr>
+                                        <p:cTn id="18" dur="200" fill="hold">
+                                          <p:stCondLst>
+                                            <p:cond delay="800"/>
+                                          </p:stCondLst>
+                                        </p:cTn>
+                                        <p:tgtEl>
+                                          <p:spTgt spid="11"/>
+                                        </p:tgtEl>
+                                        <p:attrNameLst>
+                                          <p:attrName>r</p:attrName>
+                                        </p:attrNameLst>
+                                      </p:cBhvr>
+                                    </p:animRot>
+                                  </p:childTnLst>
+                                </p:cTn>
+                              </p:par>
+                            </p:childTnLst>
+                          </p:cTn>
+                        </p:par>
+                      </p:childTnLst>
+                    </p:cTn>
+                  </p:par>
+                </p:childTnLst>
+              </p:cTn>
+              <p:prevCondLst>
+                <p:cond evt="onPrev" delay="0">
+                  <p:tgtEl>
+                    <p:sldTgt/>
+                  </p:tgtEl>
+                </p:cond>
+              </p:prevCondLst>
+              <p:nextCondLst>
+                <p:cond evt="onNext" delay="0">
+                  <p:tgtEl>
+                    <p:sldTgt/>
+                  </p:tgtEl>
+                </p:cond>
+              </p:nextCondLst>
+            </p:seq>
+          </p:childTnLst>
+        </p:cTn>
+      </p:par>
+    </p:tnLst>
+  </p:timing>
 </p:sld>
 </file>
 
@@ -8146,12 +8440,825 @@
             <p:ph idx="1"/>
           </p:nvPr>
         </p:nvSpPr>
-        <p:spPr/>
+        <p:spPr>
+          <a:xfrm>
+            <a:off x="913795" y="4305787"/>
+            <a:ext cx="10353762" cy="4058751"/>
+          </a:xfrm>
+        </p:spPr>
         <p:txBody>
           <a:bodyPr/>
           <a:lstStyle/>
           <a:p>
             <a:pPr algn="ctr"/>
+            <a:r>
+              <a:rPr lang="en-GB" dirty="0"/>
+              <a:t>Using my knowledge from the bandit problem proof of concept </a:t>
+            </a:r>
+          </a:p>
+          <a:p>
+            <a:pPr marL="36900" indent="0" algn="ctr">
+              <a:buNone/>
+            </a:pPr>
+            <a:r>
+              <a:rPr lang="en-GB" dirty="0"/>
+              <a:t>and the research done into the Monte Carlo Tree Search Algorithm</a:t>
+            </a:r>
+          </a:p>
+          <a:p>
+            <a:pPr marL="36900" indent="0" algn="ctr">
+              <a:buNone/>
+            </a:pPr>
+            <a:r>
+              <a:rPr lang="en-GB" dirty="0"/>
+              <a:t>to successfully code an AI opponent to play Connect4.</a:t>
+            </a:r>
+          </a:p>
+        </p:txBody>
+      </p:sp>
+      <p:sp>
+        <p:nvSpPr>
+          <p:cNvPr id="6" name="Content Placeholder 2">
+            <a:extLst>
+              <a:ext uri="{FF2B5EF4-FFF2-40B4-BE49-F238E27FC236}">
+                <a16:creationId xmlns:a16="http://schemas.microsoft.com/office/drawing/2014/main" id="{4263E482-3286-30DF-720D-284077032807}"/>
+              </a:ext>
+            </a:extLst>
+          </p:cNvPr>
+          <p:cNvSpPr txBox="1">
+            <a:spLocks/>
+          </p:cNvSpPr>
+          <p:nvPr/>
+        </p:nvSpPr>
+        <p:spPr>
+          <a:xfrm>
+            <a:off x="913795" y="3190113"/>
+            <a:ext cx="10353762" cy="1335810"/>
+          </a:xfrm>
+          <a:prstGeom prst="rect">
+            <a:avLst/>
+          </a:prstGeom>
+          <a:effectLst>
+            <a:outerShdw blurRad="25400" dir="17880000">
+              <a:srgbClr val="000000">
+                <a:alpha val="46000"/>
+              </a:srgbClr>
+            </a:outerShdw>
+          </a:effectLst>
+        </p:spPr>
+        <p:txBody>
+          <a:bodyPr vert="horz" lIns="91440" tIns="45720" rIns="91440" bIns="45720" rtlCol="0" anchor="t">
+            <a:normAutofit/>
+          </a:bodyPr>
+          <a:lstStyle>
+            <a:lvl1pPr marL="342900" indent="-306000" algn="l" defTabSz="457200" rtl="0" eaLnBrk="1" latinLnBrk="0" hangingPunct="1">
+              <a:spcBef>
+                <a:spcPct val="20000"/>
+              </a:spcBef>
+              <a:spcAft>
+                <a:spcPts val="600"/>
+              </a:spcAft>
+              <a:buClr>
+                <a:schemeClr val="tx2"/>
+              </a:buClr>
+              <a:buSzPct val="70000"/>
+              <a:buFont typeface="Wingdings 2" charset="2"/>
+              <a:buChar char=""/>
+              <a:defRPr sz="2000" kern="1200">
+                <a:ln>
+                  <a:solidFill>
+                    <a:schemeClr val="bg1">
+                      <a:lumMod val="75000"/>
+                      <a:lumOff val="25000"/>
+                      <a:alpha val="10000"/>
+                    </a:schemeClr>
+                  </a:solidFill>
+                </a:ln>
+                <a:solidFill>
+                  <a:schemeClr val="tx2"/>
+                </a:solidFill>
+                <a:effectLst>
+                  <a:outerShdw blurRad="9525" dist="25400" dir="14640000" algn="tl" rotWithShape="0">
+                    <a:schemeClr val="bg1">
+                      <a:alpha val="30000"/>
+                    </a:schemeClr>
+                  </a:outerShdw>
+                </a:effectLst>
+                <a:latin typeface="+mn-lt"/>
+                <a:ea typeface="+mn-ea"/>
+                <a:cs typeface="+mn-cs"/>
+              </a:defRPr>
+            </a:lvl1pPr>
+            <a:lvl2pPr marL="720000" indent="-270000" algn="l" defTabSz="457200" rtl="0" eaLnBrk="1" latinLnBrk="0" hangingPunct="1">
+              <a:spcBef>
+                <a:spcPct val="20000"/>
+              </a:spcBef>
+              <a:spcAft>
+                <a:spcPts val="600"/>
+              </a:spcAft>
+              <a:buClr>
+                <a:schemeClr val="tx2"/>
+              </a:buClr>
+              <a:buSzPct val="70000"/>
+              <a:buFont typeface="Wingdings 2" charset="2"/>
+              <a:buChar char=""/>
+              <a:defRPr sz="1800" kern="1200">
+                <a:ln>
+                  <a:solidFill>
+                    <a:schemeClr val="bg1">
+                      <a:lumMod val="75000"/>
+                      <a:lumOff val="25000"/>
+                      <a:alpha val="10000"/>
+                    </a:schemeClr>
+                  </a:solidFill>
+                </a:ln>
+                <a:solidFill>
+                  <a:schemeClr val="tx2"/>
+                </a:solidFill>
+                <a:effectLst>
+                  <a:outerShdw blurRad="9525" dist="25400" dir="14640000" algn="tl" rotWithShape="0">
+                    <a:schemeClr val="bg1">
+                      <a:alpha val="30000"/>
+                    </a:schemeClr>
+                  </a:outerShdw>
+                </a:effectLst>
+                <a:latin typeface="+mn-lt"/>
+                <a:ea typeface="+mn-ea"/>
+                <a:cs typeface="+mn-cs"/>
+              </a:defRPr>
+            </a:lvl2pPr>
+            <a:lvl3pPr marL="1026000" indent="-216000" algn="l" defTabSz="457200" rtl="0" eaLnBrk="1" latinLnBrk="0" hangingPunct="1">
+              <a:spcBef>
+                <a:spcPct val="20000"/>
+              </a:spcBef>
+              <a:spcAft>
+                <a:spcPts val="600"/>
+              </a:spcAft>
+              <a:buClr>
+                <a:schemeClr val="tx2"/>
+              </a:buClr>
+              <a:buSzPct val="70000"/>
+              <a:buFont typeface="Wingdings 2" charset="2"/>
+              <a:buChar char=""/>
+              <a:defRPr sz="1600" kern="1200">
+                <a:ln>
+                  <a:solidFill>
+                    <a:schemeClr val="bg1">
+                      <a:lumMod val="75000"/>
+                      <a:lumOff val="25000"/>
+                      <a:alpha val="10000"/>
+                    </a:schemeClr>
+                  </a:solidFill>
+                </a:ln>
+                <a:solidFill>
+                  <a:schemeClr val="tx2"/>
+                </a:solidFill>
+                <a:effectLst>
+                  <a:outerShdw blurRad="9525" dist="25400" dir="14640000" algn="tl" rotWithShape="0">
+                    <a:schemeClr val="bg1">
+                      <a:alpha val="30000"/>
+                    </a:schemeClr>
+                  </a:outerShdw>
+                </a:effectLst>
+                <a:latin typeface="+mn-lt"/>
+                <a:ea typeface="+mn-ea"/>
+                <a:cs typeface="+mn-cs"/>
+              </a:defRPr>
+            </a:lvl3pPr>
+            <a:lvl4pPr marL="1386000" indent="-216000" algn="l" defTabSz="457200" rtl="0" eaLnBrk="1" latinLnBrk="0" hangingPunct="1">
+              <a:spcBef>
+                <a:spcPct val="20000"/>
+              </a:spcBef>
+              <a:spcAft>
+                <a:spcPts val="600"/>
+              </a:spcAft>
+              <a:buClr>
+                <a:schemeClr val="tx2"/>
+              </a:buClr>
+              <a:buSzPct val="70000"/>
+              <a:buFont typeface="Wingdings 2" charset="2"/>
+              <a:buChar char=""/>
+              <a:defRPr sz="1400" kern="1200">
+                <a:ln>
+                  <a:solidFill>
+                    <a:schemeClr val="bg1">
+                      <a:lumMod val="75000"/>
+                      <a:lumOff val="25000"/>
+                      <a:alpha val="10000"/>
+                    </a:schemeClr>
+                  </a:solidFill>
+                </a:ln>
+                <a:solidFill>
+                  <a:schemeClr val="tx2"/>
+                </a:solidFill>
+                <a:effectLst>
+                  <a:outerShdw blurRad="9525" dist="25400" dir="14640000" algn="tl" rotWithShape="0">
+                    <a:schemeClr val="bg1">
+                      <a:alpha val="30000"/>
+                    </a:schemeClr>
+                  </a:outerShdw>
+                </a:effectLst>
+                <a:latin typeface="+mn-lt"/>
+                <a:ea typeface="+mn-ea"/>
+                <a:cs typeface="+mn-cs"/>
+              </a:defRPr>
+            </a:lvl4pPr>
+            <a:lvl5pPr marL="1674000" indent="-216000" algn="l" defTabSz="457200" rtl="0" eaLnBrk="1" latinLnBrk="0" hangingPunct="1">
+              <a:spcBef>
+                <a:spcPct val="20000"/>
+              </a:spcBef>
+              <a:spcAft>
+                <a:spcPts val="600"/>
+              </a:spcAft>
+              <a:buClr>
+                <a:schemeClr val="tx2"/>
+              </a:buClr>
+              <a:buSzPct val="70000"/>
+              <a:buFont typeface="Wingdings 2" charset="2"/>
+              <a:buChar char=""/>
+              <a:defRPr sz="1400" kern="1200">
+                <a:ln>
+                  <a:solidFill>
+                    <a:schemeClr val="bg1">
+                      <a:lumMod val="75000"/>
+                      <a:lumOff val="25000"/>
+                      <a:alpha val="10000"/>
+                    </a:schemeClr>
+                  </a:solidFill>
+                </a:ln>
+                <a:solidFill>
+                  <a:schemeClr val="tx2"/>
+                </a:solidFill>
+                <a:effectLst>
+                  <a:outerShdw blurRad="9525" dist="25400" dir="14640000" algn="tl" rotWithShape="0">
+                    <a:schemeClr val="bg1">
+                      <a:alpha val="30000"/>
+                    </a:schemeClr>
+                  </a:outerShdw>
+                </a:effectLst>
+                <a:latin typeface="+mn-lt"/>
+                <a:ea typeface="+mn-ea"/>
+                <a:cs typeface="+mn-cs"/>
+              </a:defRPr>
+            </a:lvl5pPr>
+            <a:lvl6pPr marL="2014600" indent="-228600" algn="l" defTabSz="457200" rtl="0" eaLnBrk="1" latinLnBrk="0" hangingPunct="1">
+              <a:spcBef>
+                <a:spcPct val="20000"/>
+              </a:spcBef>
+              <a:spcAft>
+                <a:spcPts val="600"/>
+              </a:spcAft>
+              <a:buClr>
+                <a:schemeClr val="tx2"/>
+              </a:buClr>
+              <a:buSzPct val="70000"/>
+              <a:buFont typeface="Wingdings 2" charset="2"/>
+              <a:buChar char=""/>
+              <a:defRPr sz="1400" kern="1200">
+                <a:ln>
+                  <a:solidFill>
+                    <a:schemeClr val="bg1">
+                      <a:lumMod val="75000"/>
+                      <a:lumOff val="25000"/>
+                      <a:alpha val="10000"/>
+                    </a:schemeClr>
+                  </a:solidFill>
+                </a:ln>
+                <a:solidFill>
+                  <a:schemeClr val="tx2"/>
+                </a:solidFill>
+                <a:effectLst>
+                  <a:outerShdw blurRad="9525" dist="25400" dir="14640000" algn="tl" rotWithShape="0">
+                    <a:schemeClr val="bg1">
+                      <a:alpha val="30000"/>
+                    </a:schemeClr>
+                  </a:outerShdw>
+                </a:effectLst>
+                <a:latin typeface="+mn-lt"/>
+                <a:ea typeface="+mn-ea"/>
+                <a:cs typeface="+mn-cs"/>
+              </a:defRPr>
+            </a:lvl6pPr>
+            <a:lvl7pPr marL="2401800" indent="-228600" algn="l" defTabSz="457200" rtl="0" eaLnBrk="1" latinLnBrk="0" hangingPunct="1">
+              <a:spcBef>
+                <a:spcPct val="20000"/>
+              </a:spcBef>
+              <a:spcAft>
+                <a:spcPts val="600"/>
+              </a:spcAft>
+              <a:buClr>
+                <a:schemeClr val="tx2"/>
+              </a:buClr>
+              <a:buSzPct val="70000"/>
+              <a:buFont typeface="Wingdings 2" charset="2"/>
+              <a:buChar char=""/>
+              <a:defRPr sz="1400" kern="1200">
+                <a:ln>
+                  <a:solidFill>
+                    <a:schemeClr val="bg1">
+                      <a:lumMod val="75000"/>
+                      <a:lumOff val="25000"/>
+                      <a:alpha val="10000"/>
+                    </a:schemeClr>
+                  </a:solidFill>
+                </a:ln>
+                <a:solidFill>
+                  <a:schemeClr val="tx2"/>
+                </a:solidFill>
+                <a:effectLst>
+                  <a:outerShdw blurRad="9525" dist="25400" dir="14640000" algn="tl" rotWithShape="0">
+                    <a:schemeClr val="bg1">
+                      <a:alpha val="30000"/>
+                    </a:schemeClr>
+                  </a:outerShdw>
+                </a:effectLst>
+                <a:latin typeface="+mn-lt"/>
+                <a:ea typeface="+mn-ea"/>
+                <a:cs typeface="+mn-cs"/>
+              </a:defRPr>
+            </a:lvl7pPr>
+            <a:lvl8pPr marL="2789000" indent="-228600" algn="l" defTabSz="457200" rtl="0" eaLnBrk="1" latinLnBrk="0" hangingPunct="1">
+              <a:spcBef>
+                <a:spcPct val="20000"/>
+              </a:spcBef>
+              <a:spcAft>
+                <a:spcPts val="600"/>
+              </a:spcAft>
+              <a:buClr>
+                <a:schemeClr val="tx2"/>
+              </a:buClr>
+              <a:buSzPct val="70000"/>
+              <a:buFont typeface="Wingdings 2" charset="2"/>
+              <a:buChar char=""/>
+              <a:defRPr sz="1400" kern="1200">
+                <a:ln>
+                  <a:solidFill>
+                    <a:schemeClr val="bg1">
+                      <a:lumMod val="75000"/>
+                      <a:lumOff val="25000"/>
+                      <a:alpha val="10000"/>
+                    </a:schemeClr>
+                  </a:solidFill>
+                </a:ln>
+                <a:solidFill>
+                  <a:schemeClr val="tx2"/>
+                </a:solidFill>
+                <a:effectLst>
+                  <a:outerShdw blurRad="9525" dist="25400" dir="14640000" algn="tl" rotWithShape="0">
+                    <a:schemeClr val="bg1">
+                      <a:alpha val="30000"/>
+                    </a:schemeClr>
+                  </a:outerShdw>
+                </a:effectLst>
+                <a:latin typeface="+mn-lt"/>
+                <a:ea typeface="+mn-ea"/>
+                <a:cs typeface="+mn-cs"/>
+              </a:defRPr>
+            </a:lvl8pPr>
+            <a:lvl9pPr marL="3106200" indent="-228600" algn="l" defTabSz="457200" rtl="0" eaLnBrk="1" latinLnBrk="0" hangingPunct="1">
+              <a:spcBef>
+                <a:spcPct val="20000"/>
+              </a:spcBef>
+              <a:spcAft>
+                <a:spcPts val="600"/>
+              </a:spcAft>
+              <a:buClr>
+                <a:schemeClr val="tx2"/>
+              </a:buClr>
+              <a:buSzPct val="70000"/>
+              <a:buFont typeface="Wingdings 2" charset="2"/>
+              <a:buChar char=""/>
+              <a:defRPr sz="1400" kern="1200">
+                <a:ln>
+                  <a:solidFill>
+                    <a:schemeClr val="bg1">
+                      <a:lumMod val="75000"/>
+                      <a:lumOff val="25000"/>
+                      <a:alpha val="10000"/>
+                    </a:schemeClr>
+                  </a:solidFill>
+                </a:ln>
+                <a:solidFill>
+                  <a:schemeClr val="tx2"/>
+                </a:solidFill>
+                <a:effectLst>
+                  <a:outerShdw blurRad="9525" dist="25400" dir="14640000" algn="tl" rotWithShape="0">
+                    <a:schemeClr val="bg1">
+                      <a:alpha val="30000"/>
+                    </a:schemeClr>
+                  </a:outerShdw>
+                </a:effectLst>
+                <a:latin typeface="+mn-lt"/>
+                <a:ea typeface="+mn-ea"/>
+                <a:cs typeface="+mn-cs"/>
+              </a:defRPr>
+            </a:lvl9pPr>
+          </a:lstStyle>
+          <a:p>
+            <a:pPr algn="ctr"/>
+            <a:r>
+              <a:rPr lang="en-GB" dirty="0"/>
+              <a:t>Modifying the Connect4 proof of concept to work </a:t>
+            </a:r>
+          </a:p>
+          <a:p>
+            <a:pPr marL="36900" indent="0" algn="ctr">
+              <a:buNone/>
+            </a:pPr>
+            <a:r>
+              <a:rPr lang="en-GB" dirty="0"/>
+              <a:t>with one real player and an AI opponent </a:t>
+            </a:r>
+          </a:p>
+          <a:p>
+            <a:pPr marL="36900" indent="0" algn="ctr">
+              <a:buFont typeface="Wingdings 2" charset="2"/>
+              <a:buNone/>
+            </a:pPr>
+            <a:endParaRPr lang="en-GB" dirty="0"/>
+          </a:p>
+        </p:txBody>
+      </p:sp>
+      <p:sp>
+        <p:nvSpPr>
+          <p:cNvPr id="7" name="Content Placeholder 2">
+            <a:extLst>
+              <a:ext uri="{FF2B5EF4-FFF2-40B4-BE49-F238E27FC236}">
+                <a16:creationId xmlns:a16="http://schemas.microsoft.com/office/drawing/2014/main" id="{D644B0EF-CF78-1CF4-EA5D-351559A0AF8A}"/>
+              </a:ext>
+            </a:extLst>
+          </p:cNvPr>
+          <p:cNvSpPr txBox="1">
+            <a:spLocks/>
+          </p:cNvSpPr>
+          <p:nvPr/>
+        </p:nvSpPr>
+        <p:spPr>
+          <a:xfrm>
+            <a:off x="924443" y="1942409"/>
+            <a:ext cx="10353762" cy="1178129"/>
+          </a:xfrm>
+          <a:prstGeom prst="rect">
+            <a:avLst/>
+          </a:prstGeom>
+          <a:effectLst>
+            <a:outerShdw blurRad="25400" dir="17880000">
+              <a:srgbClr val="000000">
+                <a:alpha val="46000"/>
+              </a:srgbClr>
+            </a:outerShdw>
+          </a:effectLst>
+        </p:spPr>
+        <p:txBody>
+          <a:bodyPr vert="horz" lIns="91440" tIns="45720" rIns="91440" bIns="45720" rtlCol="0" anchor="t">
+            <a:normAutofit/>
+          </a:bodyPr>
+          <a:lstStyle>
+            <a:lvl1pPr marL="342900" indent="-306000" algn="l" defTabSz="457200" rtl="0" eaLnBrk="1" latinLnBrk="0" hangingPunct="1">
+              <a:spcBef>
+                <a:spcPct val="20000"/>
+              </a:spcBef>
+              <a:spcAft>
+                <a:spcPts val="600"/>
+              </a:spcAft>
+              <a:buClr>
+                <a:schemeClr val="tx2"/>
+              </a:buClr>
+              <a:buSzPct val="70000"/>
+              <a:buFont typeface="Wingdings 2" charset="2"/>
+              <a:buChar char=""/>
+              <a:defRPr sz="2000" kern="1200">
+                <a:ln>
+                  <a:solidFill>
+                    <a:schemeClr val="bg1">
+                      <a:lumMod val="75000"/>
+                      <a:lumOff val="25000"/>
+                      <a:alpha val="10000"/>
+                    </a:schemeClr>
+                  </a:solidFill>
+                </a:ln>
+                <a:solidFill>
+                  <a:schemeClr val="tx2"/>
+                </a:solidFill>
+                <a:effectLst>
+                  <a:outerShdw blurRad="9525" dist="25400" dir="14640000" algn="tl" rotWithShape="0">
+                    <a:schemeClr val="bg1">
+                      <a:alpha val="30000"/>
+                    </a:schemeClr>
+                  </a:outerShdw>
+                </a:effectLst>
+                <a:latin typeface="+mn-lt"/>
+                <a:ea typeface="+mn-ea"/>
+                <a:cs typeface="+mn-cs"/>
+              </a:defRPr>
+            </a:lvl1pPr>
+            <a:lvl2pPr marL="720000" indent="-270000" algn="l" defTabSz="457200" rtl="0" eaLnBrk="1" latinLnBrk="0" hangingPunct="1">
+              <a:spcBef>
+                <a:spcPct val="20000"/>
+              </a:spcBef>
+              <a:spcAft>
+                <a:spcPts val="600"/>
+              </a:spcAft>
+              <a:buClr>
+                <a:schemeClr val="tx2"/>
+              </a:buClr>
+              <a:buSzPct val="70000"/>
+              <a:buFont typeface="Wingdings 2" charset="2"/>
+              <a:buChar char=""/>
+              <a:defRPr sz="1800" kern="1200">
+                <a:ln>
+                  <a:solidFill>
+                    <a:schemeClr val="bg1">
+                      <a:lumMod val="75000"/>
+                      <a:lumOff val="25000"/>
+                      <a:alpha val="10000"/>
+                    </a:schemeClr>
+                  </a:solidFill>
+                </a:ln>
+                <a:solidFill>
+                  <a:schemeClr val="tx2"/>
+                </a:solidFill>
+                <a:effectLst>
+                  <a:outerShdw blurRad="9525" dist="25400" dir="14640000" algn="tl" rotWithShape="0">
+                    <a:schemeClr val="bg1">
+                      <a:alpha val="30000"/>
+                    </a:schemeClr>
+                  </a:outerShdw>
+                </a:effectLst>
+                <a:latin typeface="+mn-lt"/>
+                <a:ea typeface="+mn-ea"/>
+                <a:cs typeface="+mn-cs"/>
+              </a:defRPr>
+            </a:lvl2pPr>
+            <a:lvl3pPr marL="1026000" indent="-216000" algn="l" defTabSz="457200" rtl="0" eaLnBrk="1" latinLnBrk="0" hangingPunct="1">
+              <a:spcBef>
+                <a:spcPct val="20000"/>
+              </a:spcBef>
+              <a:spcAft>
+                <a:spcPts val="600"/>
+              </a:spcAft>
+              <a:buClr>
+                <a:schemeClr val="tx2"/>
+              </a:buClr>
+              <a:buSzPct val="70000"/>
+              <a:buFont typeface="Wingdings 2" charset="2"/>
+              <a:buChar char=""/>
+              <a:defRPr sz="1600" kern="1200">
+                <a:ln>
+                  <a:solidFill>
+                    <a:schemeClr val="bg1">
+                      <a:lumMod val="75000"/>
+                      <a:lumOff val="25000"/>
+                      <a:alpha val="10000"/>
+                    </a:schemeClr>
+                  </a:solidFill>
+                </a:ln>
+                <a:solidFill>
+                  <a:schemeClr val="tx2"/>
+                </a:solidFill>
+                <a:effectLst>
+                  <a:outerShdw blurRad="9525" dist="25400" dir="14640000" algn="tl" rotWithShape="0">
+                    <a:schemeClr val="bg1">
+                      <a:alpha val="30000"/>
+                    </a:schemeClr>
+                  </a:outerShdw>
+                </a:effectLst>
+                <a:latin typeface="+mn-lt"/>
+                <a:ea typeface="+mn-ea"/>
+                <a:cs typeface="+mn-cs"/>
+              </a:defRPr>
+            </a:lvl3pPr>
+            <a:lvl4pPr marL="1386000" indent="-216000" algn="l" defTabSz="457200" rtl="0" eaLnBrk="1" latinLnBrk="0" hangingPunct="1">
+              <a:spcBef>
+                <a:spcPct val="20000"/>
+              </a:spcBef>
+              <a:spcAft>
+                <a:spcPts val="600"/>
+              </a:spcAft>
+              <a:buClr>
+                <a:schemeClr val="tx2"/>
+              </a:buClr>
+              <a:buSzPct val="70000"/>
+              <a:buFont typeface="Wingdings 2" charset="2"/>
+              <a:buChar char=""/>
+              <a:defRPr sz="1400" kern="1200">
+                <a:ln>
+                  <a:solidFill>
+                    <a:schemeClr val="bg1">
+                      <a:lumMod val="75000"/>
+                      <a:lumOff val="25000"/>
+                      <a:alpha val="10000"/>
+                    </a:schemeClr>
+                  </a:solidFill>
+                </a:ln>
+                <a:solidFill>
+                  <a:schemeClr val="tx2"/>
+                </a:solidFill>
+                <a:effectLst>
+                  <a:outerShdw blurRad="9525" dist="25400" dir="14640000" algn="tl" rotWithShape="0">
+                    <a:schemeClr val="bg1">
+                      <a:alpha val="30000"/>
+                    </a:schemeClr>
+                  </a:outerShdw>
+                </a:effectLst>
+                <a:latin typeface="+mn-lt"/>
+                <a:ea typeface="+mn-ea"/>
+                <a:cs typeface="+mn-cs"/>
+              </a:defRPr>
+            </a:lvl4pPr>
+            <a:lvl5pPr marL="1674000" indent="-216000" algn="l" defTabSz="457200" rtl="0" eaLnBrk="1" latinLnBrk="0" hangingPunct="1">
+              <a:spcBef>
+                <a:spcPct val="20000"/>
+              </a:spcBef>
+              <a:spcAft>
+                <a:spcPts val="600"/>
+              </a:spcAft>
+              <a:buClr>
+                <a:schemeClr val="tx2"/>
+              </a:buClr>
+              <a:buSzPct val="70000"/>
+              <a:buFont typeface="Wingdings 2" charset="2"/>
+              <a:buChar char=""/>
+              <a:defRPr sz="1400" kern="1200">
+                <a:ln>
+                  <a:solidFill>
+                    <a:schemeClr val="bg1">
+                      <a:lumMod val="75000"/>
+                      <a:lumOff val="25000"/>
+                      <a:alpha val="10000"/>
+                    </a:schemeClr>
+                  </a:solidFill>
+                </a:ln>
+                <a:solidFill>
+                  <a:schemeClr val="tx2"/>
+                </a:solidFill>
+                <a:effectLst>
+                  <a:outerShdw blurRad="9525" dist="25400" dir="14640000" algn="tl" rotWithShape="0">
+                    <a:schemeClr val="bg1">
+                      <a:alpha val="30000"/>
+                    </a:schemeClr>
+                  </a:outerShdw>
+                </a:effectLst>
+                <a:latin typeface="+mn-lt"/>
+                <a:ea typeface="+mn-ea"/>
+                <a:cs typeface="+mn-cs"/>
+              </a:defRPr>
+            </a:lvl5pPr>
+            <a:lvl6pPr marL="2014600" indent="-228600" algn="l" defTabSz="457200" rtl="0" eaLnBrk="1" latinLnBrk="0" hangingPunct="1">
+              <a:spcBef>
+                <a:spcPct val="20000"/>
+              </a:spcBef>
+              <a:spcAft>
+                <a:spcPts val="600"/>
+              </a:spcAft>
+              <a:buClr>
+                <a:schemeClr val="tx2"/>
+              </a:buClr>
+              <a:buSzPct val="70000"/>
+              <a:buFont typeface="Wingdings 2" charset="2"/>
+              <a:buChar char=""/>
+              <a:defRPr sz="1400" kern="1200">
+                <a:ln>
+                  <a:solidFill>
+                    <a:schemeClr val="bg1">
+                      <a:lumMod val="75000"/>
+                      <a:lumOff val="25000"/>
+                      <a:alpha val="10000"/>
+                    </a:schemeClr>
+                  </a:solidFill>
+                </a:ln>
+                <a:solidFill>
+                  <a:schemeClr val="tx2"/>
+                </a:solidFill>
+                <a:effectLst>
+                  <a:outerShdw blurRad="9525" dist="25400" dir="14640000" algn="tl" rotWithShape="0">
+                    <a:schemeClr val="bg1">
+                      <a:alpha val="30000"/>
+                    </a:schemeClr>
+                  </a:outerShdw>
+                </a:effectLst>
+                <a:latin typeface="+mn-lt"/>
+                <a:ea typeface="+mn-ea"/>
+                <a:cs typeface="+mn-cs"/>
+              </a:defRPr>
+            </a:lvl6pPr>
+            <a:lvl7pPr marL="2401800" indent="-228600" algn="l" defTabSz="457200" rtl="0" eaLnBrk="1" latinLnBrk="0" hangingPunct="1">
+              <a:spcBef>
+                <a:spcPct val="20000"/>
+              </a:spcBef>
+              <a:spcAft>
+                <a:spcPts val="600"/>
+              </a:spcAft>
+              <a:buClr>
+                <a:schemeClr val="tx2"/>
+              </a:buClr>
+              <a:buSzPct val="70000"/>
+              <a:buFont typeface="Wingdings 2" charset="2"/>
+              <a:buChar char=""/>
+              <a:defRPr sz="1400" kern="1200">
+                <a:ln>
+                  <a:solidFill>
+                    <a:schemeClr val="bg1">
+                      <a:lumMod val="75000"/>
+                      <a:lumOff val="25000"/>
+                      <a:alpha val="10000"/>
+                    </a:schemeClr>
+                  </a:solidFill>
+                </a:ln>
+                <a:solidFill>
+                  <a:schemeClr val="tx2"/>
+                </a:solidFill>
+                <a:effectLst>
+                  <a:outerShdw blurRad="9525" dist="25400" dir="14640000" algn="tl" rotWithShape="0">
+                    <a:schemeClr val="bg1">
+                      <a:alpha val="30000"/>
+                    </a:schemeClr>
+                  </a:outerShdw>
+                </a:effectLst>
+                <a:latin typeface="+mn-lt"/>
+                <a:ea typeface="+mn-ea"/>
+                <a:cs typeface="+mn-cs"/>
+              </a:defRPr>
+            </a:lvl7pPr>
+            <a:lvl8pPr marL="2789000" indent="-228600" algn="l" defTabSz="457200" rtl="0" eaLnBrk="1" latinLnBrk="0" hangingPunct="1">
+              <a:spcBef>
+                <a:spcPct val="20000"/>
+              </a:spcBef>
+              <a:spcAft>
+                <a:spcPts val="600"/>
+              </a:spcAft>
+              <a:buClr>
+                <a:schemeClr val="tx2"/>
+              </a:buClr>
+              <a:buSzPct val="70000"/>
+              <a:buFont typeface="Wingdings 2" charset="2"/>
+              <a:buChar char=""/>
+              <a:defRPr sz="1400" kern="1200">
+                <a:ln>
+                  <a:solidFill>
+                    <a:schemeClr val="bg1">
+                      <a:lumMod val="75000"/>
+                      <a:lumOff val="25000"/>
+                      <a:alpha val="10000"/>
+                    </a:schemeClr>
+                  </a:solidFill>
+                </a:ln>
+                <a:solidFill>
+                  <a:schemeClr val="tx2"/>
+                </a:solidFill>
+                <a:effectLst>
+                  <a:outerShdw blurRad="9525" dist="25400" dir="14640000" algn="tl" rotWithShape="0">
+                    <a:schemeClr val="bg1">
+                      <a:alpha val="30000"/>
+                    </a:schemeClr>
+                  </a:outerShdw>
+                </a:effectLst>
+                <a:latin typeface="+mn-lt"/>
+                <a:ea typeface="+mn-ea"/>
+                <a:cs typeface="+mn-cs"/>
+              </a:defRPr>
+            </a:lvl8pPr>
+            <a:lvl9pPr marL="3106200" indent="-228600" algn="l" defTabSz="457200" rtl="0" eaLnBrk="1" latinLnBrk="0" hangingPunct="1">
+              <a:spcBef>
+                <a:spcPct val="20000"/>
+              </a:spcBef>
+              <a:spcAft>
+                <a:spcPts val="600"/>
+              </a:spcAft>
+              <a:buClr>
+                <a:schemeClr val="tx2"/>
+              </a:buClr>
+              <a:buSzPct val="70000"/>
+              <a:buFont typeface="Wingdings 2" charset="2"/>
+              <a:buChar char=""/>
+              <a:defRPr sz="1400" kern="1200">
+                <a:ln>
+                  <a:solidFill>
+                    <a:schemeClr val="bg1">
+                      <a:lumMod val="75000"/>
+                      <a:lumOff val="25000"/>
+                      <a:alpha val="10000"/>
+                    </a:schemeClr>
+                  </a:solidFill>
+                </a:ln>
+                <a:solidFill>
+                  <a:schemeClr val="tx2"/>
+                </a:solidFill>
+                <a:effectLst>
+                  <a:outerShdw blurRad="9525" dist="25400" dir="14640000" algn="tl" rotWithShape="0">
+                    <a:schemeClr val="bg1">
+                      <a:alpha val="30000"/>
+                    </a:schemeClr>
+                  </a:outerShdw>
+                </a:effectLst>
+                <a:latin typeface="+mn-lt"/>
+                <a:ea typeface="+mn-ea"/>
+                <a:cs typeface="+mn-cs"/>
+              </a:defRPr>
+            </a:lvl9pPr>
+          </a:lstStyle>
+          <a:p>
+            <a:pPr algn="ctr"/>
             <a:endParaRPr lang="en-GB" dirty="0"/>
           </a:p>
           <a:p>
@@ -8159,57 +9266,6 @@
             <a:r>
               <a:rPr lang="en-GB" dirty="0"/>
               <a:t>Researching into GUI interfaces to implement for the game</a:t>
-            </a:r>
-          </a:p>
-          <a:p>
-            <a:pPr algn="ctr"/>
-            <a:endParaRPr lang="en-GB" dirty="0"/>
-          </a:p>
-          <a:p>
-            <a:pPr algn="ctr"/>
-            <a:r>
-              <a:rPr lang="en-GB" dirty="0"/>
-              <a:t>Modifying the Connect4 proof of concept to work </a:t>
-            </a:r>
-          </a:p>
-          <a:p>
-            <a:pPr marL="36900" indent="0" algn="ctr">
-              <a:buNone/>
-            </a:pPr>
-            <a:r>
-              <a:rPr lang="en-GB" dirty="0"/>
-              <a:t>with one real player and an AI opponent </a:t>
-            </a:r>
-          </a:p>
-          <a:p>
-            <a:pPr marL="36900" indent="0" algn="ctr">
-              <a:buNone/>
-            </a:pPr>
-            <a:endParaRPr lang="en-GB" dirty="0"/>
-          </a:p>
-          <a:p>
-            <a:pPr algn="ctr"/>
-            <a:r>
-              <a:rPr lang="en-GB" dirty="0"/>
-              <a:t>Using my knowledge from the bandit problem proof of concept </a:t>
-            </a:r>
-          </a:p>
-          <a:p>
-            <a:pPr marL="36900" indent="0" algn="ctr">
-              <a:buNone/>
-            </a:pPr>
-            <a:r>
-              <a:rPr lang="en-GB" dirty="0"/>
-              <a:t>and the research done into the Monte Carlo Tree Search Algorithm</a:t>
-            </a:r>
-          </a:p>
-          <a:p>
-            <a:pPr marL="36900" indent="0" algn="ctr">
-              <a:buNone/>
-            </a:pPr>
-            <a:r>
-              <a:rPr lang="en-GB" dirty="0"/>
-              <a:t>to successfully code an AI opponent to play Connect4.</a:t>
             </a:r>
           </a:p>
         </p:txBody>
@@ -8224,6 +9280,297 @@
   <p:clrMapOvr>
     <a:masterClrMapping/>
   </p:clrMapOvr>
+  <p:transition spd="slow">
+    <p:cover/>
+  </p:transition>
+  <p:timing>
+    <p:tnLst>
+      <p:par>
+        <p:cTn id="1" dur="indefinite" restart="never" nodeType="tmRoot">
+          <p:childTnLst>
+            <p:seq concurrent="1" nextAc="seek">
+              <p:cTn id="2" dur="indefinite" nodeType="mainSeq">
+                <p:childTnLst>
+                  <p:par>
+                    <p:cTn id="3" fill="hold">
+                      <p:stCondLst>
+                        <p:cond delay="indefinite"/>
+                      </p:stCondLst>
+                      <p:childTnLst>
+                        <p:par>
+                          <p:cTn id="4" fill="hold">
+                            <p:stCondLst>
+                              <p:cond delay="0"/>
+                            </p:stCondLst>
+                            <p:childTnLst>
+                              <p:par>
+                                <p:cTn id="5" presetID="10" presetClass="entr" presetSubtype="0" fill="hold" grpId="0" nodeType="clickEffect">
+                                  <p:stCondLst>
+                                    <p:cond delay="0"/>
+                                  </p:stCondLst>
+                                  <p:childTnLst>
+                                    <p:set>
+                                      <p:cBhvr>
+                                        <p:cTn id="6" dur="1" fill="hold">
+                                          <p:stCondLst>
+                                            <p:cond delay="0"/>
+                                          </p:stCondLst>
+                                        </p:cTn>
+                                        <p:tgtEl>
+                                          <p:spTgt spid="7"/>
+                                        </p:tgtEl>
+                                        <p:attrNameLst>
+                                          <p:attrName>style.visibility</p:attrName>
+                                        </p:attrNameLst>
+                                      </p:cBhvr>
+                                      <p:to>
+                                        <p:strVal val="visible"/>
+                                      </p:to>
+                                    </p:set>
+                                    <p:animEffect transition="in" filter="fade">
+                                      <p:cBhvr>
+                                        <p:cTn id="7" dur="500"/>
+                                        <p:tgtEl>
+                                          <p:spTgt spid="7"/>
+                                        </p:tgtEl>
+                                      </p:cBhvr>
+                                    </p:animEffect>
+                                  </p:childTnLst>
+                                </p:cTn>
+                              </p:par>
+                            </p:childTnLst>
+                          </p:cTn>
+                        </p:par>
+                      </p:childTnLst>
+                    </p:cTn>
+                  </p:par>
+                  <p:par>
+                    <p:cTn id="8" fill="hold">
+                      <p:stCondLst>
+                        <p:cond delay="indefinite"/>
+                      </p:stCondLst>
+                      <p:childTnLst>
+                        <p:par>
+                          <p:cTn id="9" fill="hold">
+                            <p:stCondLst>
+                              <p:cond delay="0"/>
+                            </p:stCondLst>
+                            <p:childTnLst>
+                              <p:par>
+                                <p:cTn id="10" presetID="10" presetClass="entr" presetSubtype="0" fill="hold" grpId="0" nodeType="clickEffect">
+                                  <p:stCondLst>
+                                    <p:cond delay="0"/>
+                                  </p:stCondLst>
+                                  <p:childTnLst>
+                                    <p:set>
+                                      <p:cBhvr>
+                                        <p:cTn id="11" dur="1" fill="hold">
+                                          <p:stCondLst>
+                                            <p:cond delay="0"/>
+                                          </p:stCondLst>
+                                        </p:cTn>
+                                        <p:tgtEl>
+                                          <p:spTgt spid="6"/>
+                                        </p:tgtEl>
+                                        <p:attrNameLst>
+                                          <p:attrName>style.visibility</p:attrName>
+                                        </p:attrNameLst>
+                                      </p:cBhvr>
+                                      <p:to>
+                                        <p:strVal val="visible"/>
+                                      </p:to>
+                                    </p:set>
+                                    <p:animEffect transition="in" filter="fade">
+                                      <p:cBhvr>
+                                        <p:cTn id="12" dur="500"/>
+                                        <p:tgtEl>
+                                          <p:spTgt spid="6"/>
+                                        </p:tgtEl>
+                                      </p:cBhvr>
+                                    </p:animEffect>
+                                  </p:childTnLst>
+                                </p:cTn>
+                              </p:par>
+                            </p:childTnLst>
+                          </p:cTn>
+                        </p:par>
+                      </p:childTnLst>
+                    </p:cTn>
+                  </p:par>
+                  <p:par>
+                    <p:cTn id="13" fill="hold">
+                      <p:stCondLst>
+                        <p:cond delay="indefinite"/>
+                      </p:stCondLst>
+                      <p:childTnLst>
+                        <p:par>
+                          <p:cTn id="14" fill="hold">
+                            <p:stCondLst>
+                              <p:cond delay="0"/>
+                            </p:stCondLst>
+                            <p:childTnLst>
+                              <p:par>
+                                <p:cTn id="15" presetID="10" presetClass="entr" presetSubtype="0" fill="hold" grpId="0" nodeType="clickEffect">
+                                  <p:stCondLst>
+                                    <p:cond delay="0"/>
+                                  </p:stCondLst>
+                                  <p:childTnLst>
+                                    <p:set>
+                                      <p:cBhvr>
+                                        <p:cTn id="16" dur="1" fill="hold">
+                                          <p:stCondLst>
+                                            <p:cond delay="0"/>
+                                          </p:stCondLst>
+                                        </p:cTn>
+                                        <p:tgtEl>
+                                          <p:spTgt spid="3">
+                                            <p:txEl>
+                                              <p:pRg st="0" end="0"/>
+                                            </p:txEl>
+                                          </p:spTgt>
+                                        </p:tgtEl>
+                                        <p:attrNameLst>
+                                          <p:attrName>style.visibility</p:attrName>
+                                        </p:attrNameLst>
+                                      </p:cBhvr>
+                                      <p:to>
+                                        <p:strVal val="visible"/>
+                                      </p:to>
+                                    </p:set>
+                                    <p:animEffect transition="in" filter="fade">
+                                      <p:cBhvr>
+                                        <p:cTn id="17" dur="500"/>
+                                        <p:tgtEl>
+                                          <p:spTgt spid="3">
+                                            <p:txEl>
+                                              <p:pRg st="0" end="0"/>
+                                            </p:txEl>
+                                          </p:spTgt>
+                                        </p:tgtEl>
+                                      </p:cBhvr>
+                                    </p:animEffect>
+                                  </p:childTnLst>
+                                </p:cTn>
+                              </p:par>
+                              <p:par>
+                                <p:cTn id="18" presetID="10" presetClass="entr" presetSubtype="0" fill="hold" grpId="0" nodeType="withEffect">
+                                  <p:stCondLst>
+                                    <p:cond delay="0"/>
+                                  </p:stCondLst>
+                                  <p:childTnLst>
+                                    <p:set>
+                                      <p:cBhvr>
+                                        <p:cTn id="19" dur="1" fill="hold">
+                                          <p:stCondLst>
+                                            <p:cond delay="0"/>
+                                          </p:stCondLst>
+                                        </p:cTn>
+                                        <p:tgtEl>
+                                          <p:spTgt spid="3">
+                                            <p:txEl>
+                                              <p:pRg st="1" end="1"/>
+                                            </p:txEl>
+                                          </p:spTgt>
+                                        </p:tgtEl>
+                                        <p:attrNameLst>
+                                          <p:attrName>style.visibility</p:attrName>
+                                        </p:attrNameLst>
+                                      </p:cBhvr>
+                                      <p:to>
+                                        <p:strVal val="visible"/>
+                                      </p:to>
+                                    </p:set>
+                                    <p:animEffect transition="in" filter="fade">
+                                      <p:cBhvr>
+                                        <p:cTn id="20" dur="500"/>
+                                        <p:tgtEl>
+                                          <p:spTgt spid="3">
+                                            <p:txEl>
+                                              <p:pRg st="1" end="1"/>
+                                            </p:txEl>
+                                          </p:spTgt>
+                                        </p:tgtEl>
+                                      </p:cBhvr>
+                                    </p:animEffect>
+                                  </p:childTnLst>
+                                </p:cTn>
+                              </p:par>
+                              <p:par>
+                                <p:cTn id="21" presetID="10" presetClass="entr" presetSubtype="0" fill="hold" grpId="0" nodeType="withEffect">
+                                  <p:stCondLst>
+                                    <p:cond delay="0"/>
+                                  </p:stCondLst>
+                                  <p:childTnLst>
+                                    <p:set>
+                                      <p:cBhvr>
+                                        <p:cTn id="22" dur="1" fill="hold">
+                                          <p:stCondLst>
+                                            <p:cond delay="0"/>
+                                          </p:stCondLst>
+                                        </p:cTn>
+                                        <p:tgtEl>
+                                          <p:spTgt spid="3">
+                                            <p:txEl>
+                                              <p:pRg st="2" end="2"/>
+                                            </p:txEl>
+                                          </p:spTgt>
+                                        </p:tgtEl>
+                                        <p:attrNameLst>
+                                          <p:attrName>style.visibility</p:attrName>
+                                        </p:attrNameLst>
+                                      </p:cBhvr>
+                                      <p:to>
+                                        <p:strVal val="visible"/>
+                                      </p:to>
+                                    </p:set>
+                                    <p:animEffect transition="in" filter="fade">
+                                      <p:cBhvr>
+                                        <p:cTn id="23" dur="500"/>
+                                        <p:tgtEl>
+                                          <p:spTgt spid="3">
+                                            <p:txEl>
+                                              <p:pRg st="2" end="2"/>
+                                            </p:txEl>
+                                          </p:spTgt>
+                                        </p:tgtEl>
+                                      </p:cBhvr>
+                                    </p:animEffect>
+                                  </p:childTnLst>
+                                </p:cTn>
+                              </p:par>
+                            </p:childTnLst>
+                          </p:cTn>
+                        </p:par>
+                      </p:childTnLst>
+                    </p:cTn>
+                  </p:par>
+                </p:childTnLst>
+              </p:cTn>
+              <p:prevCondLst>
+                <p:cond evt="onPrev" delay="0">
+                  <p:tgtEl>
+                    <p:sldTgt/>
+                  </p:tgtEl>
+                </p:cond>
+              </p:prevCondLst>
+              <p:nextCondLst>
+                <p:cond evt="onNext" delay="0">
+                  <p:tgtEl>
+                    <p:sldTgt/>
+                  </p:tgtEl>
+                </p:cond>
+              </p:nextCondLst>
+            </p:seq>
+          </p:childTnLst>
+        </p:cTn>
+      </p:par>
+    </p:tnLst>
+    <p:bldLst>
+      <p:bldP spid="3" grpId="0" uiExpand="1" build="p"/>
+      <p:bldP spid="6" grpId="0"/>
+      <p:bldP spid="7" grpId="0"/>
+    </p:bldLst>
+  </p:timing>
 </p:sld>
 </file>
 
@@ -8287,13 +9634,13 @@
         </p:nvSpPr>
         <p:spPr>
           <a:xfrm>
-            <a:off x="659661" y="1679225"/>
-            <a:ext cx="3382832" cy="3499549"/>
+            <a:off x="659661" y="1679226"/>
+            <a:ext cx="3382832" cy="1172616"/>
           </a:xfrm>
         </p:spPr>
         <p:txBody>
           <a:bodyPr vert="horz" lIns="91440" tIns="45720" rIns="91440" bIns="45720" rtlCol="0" anchor="b">
-            <a:normAutofit fontScale="90000"/>
+            <a:normAutofit/>
           </a:bodyPr>
           <a:lstStyle/>
           <a:p>
@@ -8305,37 +9652,6 @@
             <a:r>
               <a:rPr lang="en-US" sz="3900" dirty="0"/>
               <a:t>Any Questions?</a:t>
-            </a:r>
-            <a:br>
-              <a:rPr lang="en-US" sz="3900" dirty="0"/>
-            </a:br>
-            <a:br>
-              <a:rPr lang="en-US" sz="3900" dirty="0"/>
-            </a:br>
-            <a:r>
-              <a:rPr lang="en-US" sz="3900" dirty="0"/>
-              <a:t>&amp;</a:t>
-            </a:r>
-            <a:br>
-              <a:rPr lang="en-US" sz="3900" dirty="0"/>
-            </a:br>
-            <a:r>
-              <a:rPr lang="en-US" sz="3900" dirty="0"/>
-              <a:t>Thank You</a:t>
-            </a:r>
-            <a:br>
-              <a:rPr lang="en-US" sz="3900" dirty="0"/>
-            </a:br>
-            <a:r>
-              <a:rPr lang="en-US" sz="3900" dirty="0"/>
-              <a:t>for </a:t>
-            </a:r>
-            <a:br>
-              <a:rPr lang="en-US" sz="3900" dirty="0"/>
-            </a:br>
-            <a:r>
-              <a:rPr lang="en-US" sz="3900" dirty="0"/>
-              <a:t>Listening</a:t>
             </a:r>
           </a:p>
         </p:txBody>
@@ -8473,6 +9789,162 @@
           </a:extLst>
         </p:spPr>
       </p:pic>
+      <p:sp>
+        <p:nvSpPr>
+          <p:cNvPr id="3" name="Title 1">
+            <a:extLst>
+              <a:ext uri="{FF2B5EF4-FFF2-40B4-BE49-F238E27FC236}">
+                <a16:creationId xmlns:a16="http://schemas.microsoft.com/office/drawing/2014/main" id="{80B3D015-6843-D231-D2C3-0DA33E2A1B18}"/>
+              </a:ext>
+            </a:extLst>
+          </p:cNvPr>
+          <p:cNvSpPr txBox="1">
+            <a:spLocks/>
+          </p:cNvSpPr>
+          <p:nvPr/>
+        </p:nvSpPr>
+        <p:spPr>
+          <a:xfrm>
+            <a:off x="659660" y="1487594"/>
+            <a:ext cx="3382832" cy="3499549"/>
+          </a:xfrm>
+          <a:prstGeom prst="rect">
+            <a:avLst/>
+          </a:prstGeom>
+          <a:effectLst>
+            <a:outerShdw blurRad="25400" dir="17880000">
+              <a:srgbClr val="000000">
+                <a:alpha val="46000"/>
+              </a:srgbClr>
+            </a:outerShdw>
+          </a:effectLst>
+        </p:spPr>
+        <p:txBody>
+          <a:bodyPr vert="horz" lIns="91440" tIns="45720" rIns="91440" bIns="45720" rtlCol="0" anchor="b">
+            <a:normAutofit fontScale="97500"/>
+          </a:bodyPr>
+          <a:lstStyle>
+            <a:lvl1pPr algn="ctr" defTabSz="457200" rtl="0" eaLnBrk="1" latinLnBrk="0" hangingPunct="1">
+              <a:spcBef>
+                <a:spcPct val="0"/>
+              </a:spcBef>
+              <a:buNone/>
+              <a:defRPr sz="4000" kern="1200">
+                <a:ln>
+                  <a:solidFill>
+                    <a:schemeClr val="bg1">
+                      <a:lumMod val="75000"/>
+                      <a:lumOff val="25000"/>
+                      <a:alpha val="10000"/>
+                    </a:schemeClr>
+                  </a:solidFill>
+                </a:ln>
+                <a:solidFill>
+                  <a:schemeClr val="tx2"/>
+                </a:solidFill>
+                <a:effectLst>
+                  <a:outerShdw blurRad="9525" dist="25400" dir="14640000" algn="tl" rotWithShape="0">
+                    <a:schemeClr val="bg1">
+                      <a:alpha val="30000"/>
+                    </a:schemeClr>
+                  </a:outerShdw>
+                </a:effectLst>
+                <a:latin typeface="+mj-lt"/>
+                <a:ea typeface="+mj-ea"/>
+                <a:cs typeface="Trebuchet MS"/>
+              </a:defRPr>
+            </a:lvl1pPr>
+            <a:lvl2pPr eaLnBrk="1" hangingPunct="1">
+              <a:defRPr>
+                <a:solidFill>
+                  <a:schemeClr val="tx2"/>
+                </a:solidFill>
+              </a:defRPr>
+            </a:lvl2pPr>
+            <a:lvl3pPr eaLnBrk="1" hangingPunct="1">
+              <a:defRPr>
+                <a:solidFill>
+                  <a:schemeClr val="tx2"/>
+                </a:solidFill>
+              </a:defRPr>
+            </a:lvl3pPr>
+            <a:lvl4pPr eaLnBrk="1" hangingPunct="1">
+              <a:defRPr>
+                <a:solidFill>
+                  <a:schemeClr val="tx2"/>
+                </a:solidFill>
+              </a:defRPr>
+            </a:lvl4pPr>
+            <a:lvl5pPr eaLnBrk="1" hangingPunct="1">
+              <a:defRPr>
+                <a:solidFill>
+                  <a:schemeClr val="tx2"/>
+                </a:solidFill>
+              </a:defRPr>
+            </a:lvl5pPr>
+            <a:lvl6pPr eaLnBrk="1" hangingPunct="1">
+              <a:defRPr>
+                <a:solidFill>
+                  <a:schemeClr val="tx2"/>
+                </a:solidFill>
+              </a:defRPr>
+            </a:lvl6pPr>
+            <a:lvl7pPr eaLnBrk="1" hangingPunct="1">
+              <a:defRPr>
+                <a:solidFill>
+                  <a:schemeClr val="tx2"/>
+                </a:solidFill>
+              </a:defRPr>
+            </a:lvl7pPr>
+            <a:lvl8pPr eaLnBrk="1" hangingPunct="1">
+              <a:defRPr>
+                <a:solidFill>
+                  <a:schemeClr val="tx2"/>
+                </a:solidFill>
+              </a:defRPr>
+            </a:lvl8pPr>
+            <a:lvl9pPr eaLnBrk="1" hangingPunct="1">
+              <a:defRPr>
+                <a:solidFill>
+                  <a:schemeClr val="tx2"/>
+                </a:solidFill>
+              </a:defRPr>
+            </a:lvl9pPr>
+          </a:lstStyle>
+          <a:p>
+            <a:pPr>
+              <a:lnSpc>
+                <a:spcPct val="90000"/>
+              </a:lnSpc>
+            </a:pPr>
+            <a:r>
+              <a:rPr lang="en-US" sz="3900" dirty="0"/>
+              <a:t>&amp;</a:t>
+            </a:r>
+            <a:br>
+              <a:rPr lang="en-US" sz="3900" dirty="0"/>
+            </a:br>
+            <a:r>
+              <a:rPr lang="en-US" sz="3900" dirty="0"/>
+              <a:t>Thank You</a:t>
+            </a:r>
+            <a:br>
+              <a:rPr lang="en-US" sz="3900" dirty="0"/>
+            </a:br>
+            <a:r>
+              <a:rPr lang="en-US" sz="3900" dirty="0"/>
+              <a:t>for </a:t>
+            </a:r>
+            <a:br>
+              <a:rPr lang="en-US" sz="3900" dirty="0"/>
+            </a:br>
+            <a:r>
+              <a:rPr lang="en-US" sz="3900" dirty="0"/>
+              <a:t>Listening</a:t>
+            </a:r>
+          </a:p>
+        </p:txBody>
+      </p:sp>
     </p:spTree>
     <p:extLst>
       <p:ext uri="{BB962C8B-B14F-4D97-AF65-F5344CB8AC3E}">
@@ -8483,6 +9955,149 @@
   <p:clrMapOvr>
     <a:masterClrMapping/>
   </p:clrMapOvr>
+  <p:transition spd="slow">
+    <p:cover/>
+  </p:transition>
+  <p:timing>
+    <p:tnLst>
+      <p:par>
+        <p:cTn id="1" dur="indefinite" restart="never" nodeType="tmRoot">
+          <p:childTnLst>
+            <p:seq concurrent="1" nextAc="seek">
+              <p:cTn id="2" dur="indefinite" nodeType="mainSeq">
+                <p:childTnLst>
+                  <p:par>
+                    <p:cTn id="3" fill="hold">
+                      <p:stCondLst>
+                        <p:cond delay="indefinite"/>
+                      </p:stCondLst>
+                      <p:childTnLst>
+                        <p:par>
+                          <p:cTn id="4" fill="hold">
+                            <p:stCondLst>
+                              <p:cond delay="0"/>
+                            </p:stCondLst>
+                            <p:childTnLst>
+                              <p:par>
+                                <p:cTn id="5" presetID="10" presetClass="entr" presetSubtype="0" fill="hold" grpId="0" nodeType="clickEffect">
+                                  <p:stCondLst>
+                                    <p:cond delay="0"/>
+                                  </p:stCondLst>
+                                  <p:childTnLst>
+                                    <p:set>
+                                      <p:cBhvr>
+                                        <p:cTn id="6" dur="1" fill="hold">
+                                          <p:stCondLst>
+                                            <p:cond delay="0"/>
+                                          </p:stCondLst>
+                                        </p:cTn>
+                                        <p:tgtEl>
+                                          <p:spTgt spid="2"/>
+                                        </p:tgtEl>
+                                        <p:attrNameLst>
+                                          <p:attrName>style.visibility</p:attrName>
+                                        </p:attrNameLst>
+                                      </p:cBhvr>
+                                      <p:to>
+                                        <p:strVal val="visible"/>
+                                      </p:to>
+                                    </p:set>
+                                    <p:animEffect transition="in" filter="fade">
+                                      <p:cBhvr>
+                                        <p:cTn id="7" dur="500"/>
+                                        <p:tgtEl>
+                                          <p:spTgt spid="2"/>
+                                        </p:tgtEl>
+                                      </p:cBhvr>
+                                    </p:animEffect>
+                                  </p:childTnLst>
+                                </p:cTn>
+                              </p:par>
+                            </p:childTnLst>
+                          </p:cTn>
+                        </p:par>
+                      </p:childTnLst>
+                    </p:cTn>
+                  </p:par>
+                  <p:par>
+                    <p:cTn id="8" fill="hold">
+                      <p:stCondLst>
+                        <p:cond delay="indefinite"/>
+                      </p:stCondLst>
+                      <p:childTnLst>
+                        <p:par>
+                          <p:cTn id="9" fill="hold">
+                            <p:stCondLst>
+                              <p:cond delay="0"/>
+                            </p:stCondLst>
+                            <p:childTnLst>
+                              <p:par>
+                                <p:cTn id="10" presetID="10" presetClass="entr" presetSubtype="0" fill="hold" grpId="0" nodeType="clickEffect">
+                                  <p:stCondLst>
+                                    <p:cond delay="0"/>
+                                  </p:stCondLst>
+                                  <p:childTnLst>
+                                    <p:set>
+                                      <p:cBhvr>
+                                        <p:cTn id="11" dur="1" fill="hold">
+                                          <p:stCondLst>
+                                            <p:cond delay="0"/>
+                                          </p:stCondLst>
+                                        </p:cTn>
+                                        <p:tgtEl>
+                                          <p:spTgt spid="3"/>
+                                        </p:tgtEl>
+                                        <p:attrNameLst>
+                                          <p:attrName>style.visibility</p:attrName>
+                                        </p:attrNameLst>
+                                      </p:cBhvr>
+                                      <p:to>
+                                        <p:strVal val="visible"/>
+                                      </p:to>
+                                    </p:set>
+                                    <p:animEffect transition="in" filter="fade">
+                                      <p:cBhvr>
+                                        <p:cTn id="12" dur="500"/>
+                                        <p:tgtEl>
+                                          <p:spTgt spid="3"/>
+                                        </p:tgtEl>
+                                      </p:cBhvr>
+                                    </p:animEffect>
+                                  </p:childTnLst>
+                                </p:cTn>
+                              </p:par>
+                            </p:childTnLst>
+                          </p:cTn>
+                        </p:par>
+                      </p:childTnLst>
+                    </p:cTn>
+                  </p:par>
+                </p:childTnLst>
+              </p:cTn>
+              <p:prevCondLst>
+                <p:cond evt="onPrev" delay="0">
+                  <p:tgtEl>
+                    <p:sldTgt/>
+                  </p:tgtEl>
+                </p:cond>
+              </p:prevCondLst>
+              <p:nextCondLst>
+                <p:cond evt="onNext" delay="0">
+                  <p:tgtEl>
+                    <p:sldTgt/>
+                  </p:tgtEl>
+                </p:cond>
+              </p:nextCondLst>
+            </p:seq>
+          </p:childTnLst>
+        </p:cTn>
+      </p:par>
+    </p:tnLst>
+    <p:bldLst>
+      <p:bldP spid="2" grpId="0"/>
+      <p:bldP spid="3" grpId="0"/>
+    </p:bldLst>
+  </p:timing>
 </p:sld>
 </file>
 

</xml_diff>